<commit_message>
edit ppt slide with edited diagrams
</commit_message>
<xml_diff>
--- a/docs/diagrams/Diagrams(CS2103T - V0.3).pptx
+++ b/docs/diagrams/Diagrams(CS2103T - V0.3).pptx
@@ -216,7 +216,7 @@
           <a:p>
             <a:fld id="{F5CC4B3F-88C1-4FFA-B1B6-F41C21DC6924}" type="datetimeFigureOut">
               <a:rPr lang="en-US" smtClean="0"/>
-              <a:t>10/16/2016</a:t>
+              <a:t>10/19/2016</a:t>
             </a:fld>
             <a:endParaRPr lang="en-US"/>
           </a:p>
@@ -665,7 +665,7 @@
           <a:p>
             <a:fld id="{78C97017-6FC3-485B-9764-EAC9E56C1D49}" type="datetimeFigureOut">
               <a:rPr lang="en-US" smtClean="0"/>
-              <a:t>10/16/2016</a:t>
+              <a:t>10/19/2016</a:t>
             </a:fld>
             <a:endParaRPr lang="en-US"/>
           </a:p>
@@ -835,7 +835,7 @@
           <a:p>
             <a:fld id="{78C97017-6FC3-485B-9764-EAC9E56C1D49}" type="datetimeFigureOut">
               <a:rPr lang="en-US" smtClean="0"/>
-              <a:t>10/16/2016</a:t>
+              <a:t>10/19/2016</a:t>
             </a:fld>
             <a:endParaRPr lang="en-US"/>
           </a:p>
@@ -1015,7 +1015,7 @@
           <a:p>
             <a:fld id="{78C97017-6FC3-485B-9764-EAC9E56C1D49}" type="datetimeFigureOut">
               <a:rPr lang="en-US" smtClean="0"/>
-              <a:t>10/16/2016</a:t>
+              <a:t>10/19/2016</a:t>
             </a:fld>
             <a:endParaRPr lang="en-US"/>
           </a:p>
@@ -1185,7 +1185,7 @@
           <a:p>
             <a:fld id="{78C97017-6FC3-485B-9764-EAC9E56C1D49}" type="datetimeFigureOut">
               <a:rPr lang="en-US" smtClean="0"/>
-              <a:t>10/16/2016</a:t>
+              <a:t>10/19/2016</a:t>
             </a:fld>
             <a:endParaRPr lang="en-US"/>
           </a:p>
@@ -1431,7 +1431,7 @@
           <a:p>
             <a:fld id="{78C97017-6FC3-485B-9764-EAC9E56C1D49}" type="datetimeFigureOut">
               <a:rPr lang="en-US" smtClean="0"/>
-              <a:t>10/16/2016</a:t>
+              <a:t>10/19/2016</a:t>
             </a:fld>
             <a:endParaRPr lang="en-US"/>
           </a:p>
@@ -1719,7 +1719,7 @@
           <a:p>
             <a:fld id="{78C97017-6FC3-485B-9764-EAC9E56C1D49}" type="datetimeFigureOut">
               <a:rPr lang="en-US" smtClean="0"/>
-              <a:t>10/16/2016</a:t>
+              <a:t>10/19/2016</a:t>
             </a:fld>
             <a:endParaRPr lang="en-US"/>
           </a:p>
@@ -2141,7 +2141,7 @@
           <a:p>
             <a:fld id="{78C97017-6FC3-485B-9764-EAC9E56C1D49}" type="datetimeFigureOut">
               <a:rPr lang="en-US" smtClean="0"/>
-              <a:t>10/16/2016</a:t>
+              <a:t>10/19/2016</a:t>
             </a:fld>
             <a:endParaRPr lang="en-US"/>
           </a:p>
@@ -2259,7 +2259,7 @@
           <a:p>
             <a:fld id="{78C97017-6FC3-485B-9764-EAC9E56C1D49}" type="datetimeFigureOut">
               <a:rPr lang="en-US" smtClean="0"/>
-              <a:t>10/16/2016</a:t>
+              <a:t>10/19/2016</a:t>
             </a:fld>
             <a:endParaRPr lang="en-US"/>
           </a:p>
@@ -2354,7 +2354,7 @@
           <a:p>
             <a:fld id="{78C97017-6FC3-485B-9764-EAC9E56C1D49}" type="datetimeFigureOut">
               <a:rPr lang="en-US" smtClean="0"/>
-              <a:t>10/16/2016</a:t>
+              <a:t>10/19/2016</a:t>
             </a:fld>
             <a:endParaRPr lang="en-US"/>
           </a:p>
@@ -2631,7 +2631,7 @@
           <a:p>
             <a:fld id="{78C97017-6FC3-485B-9764-EAC9E56C1D49}" type="datetimeFigureOut">
               <a:rPr lang="en-US" smtClean="0"/>
-              <a:t>10/16/2016</a:t>
+              <a:t>10/19/2016</a:t>
             </a:fld>
             <a:endParaRPr lang="en-US"/>
           </a:p>
@@ -2884,7 +2884,7 @@
           <a:p>
             <a:fld id="{78C97017-6FC3-485B-9764-EAC9E56C1D49}" type="datetimeFigureOut">
               <a:rPr lang="en-US" smtClean="0"/>
-              <a:t>10/16/2016</a:t>
+              <a:t>10/19/2016</a:t>
             </a:fld>
             <a:endParaRPr lang="en-US"/>
           </a:p>
@@ -3097,7 +3097,7 @@
           <a:p>
             <a:fld id="{78C97017-6FC3-485B-9764-EAC9E56C1D49}" type="datetimeFigureOut">
               <a:rPr lang="en-US" smtClean="0"/>
-              <a:t>10/16/2016</a:t>
+              <a:t>10/19/2016</a:t>
             </a:fld>
             <a:endParaRPr lang="en-US"/>
           </a:p>
@@ -5671,8 +5671,8 @@
         </p:nvSpPr>
         <p:spPr>
           <a:xfrm>
-            <a:off x="2166172" y="1453379"/>
-            <a:ext cx="1424846" cy="215444"/>
+            <a:off x="1905000" y="1524000"/>
+            <a:ext cx="1838418" cy="215444"/>
           </a:xfrm>
           <a:prstGeom prst="rect">
             <a:avLst/>
@@ -5691,7 +5691,7 @@
                   <a:srgbClr val="0070C0"/>
                 </a:solidFill>
               </a:rPr>
-              <a:t>execute(“delete 1”)</a:t>
+              <a:t>execute(“delete task 1”)</a:t>
             </a:r>
             <a:endParaRPr lang="en-US" sz="1400" dirty="0">
               <a:solidFill>
@@ -5765,7 +5765,7 @@
                   <a:srgbClr val="7030A0"/>
                 </a:solidFill>
               </a:rPr>
-              <a:t>deleteActivity</a:t>
+              <a:t>deleteTask</a:t>
             </a:r>
             <a:r>
               <a:rPr lang="en-US" sz="1400" dirty="0" smtClean="0">
@@ -6632,8 +6632,8 @@
         </p:nvCxnSpPr>
         <p:spPr>
           <a:xfrm>
-            <a:off x="1577029" y="5065911"/>
-            <a:ext cx="2797300" cy="5309"/>
+            <a:off x="1295400" y="5029200"/>
+            <a:ext cx="3102100" cy="5309"/>
           </a:xfrm>
           <a:prstGeom prst="straightConnector1">
             <a:avLst/>
@@ -11528,8 +11528,8 @@
         </p:nvSpPr>
         <p:spPr>
           <a:xfrm>
-            <a:off x="685800" y="1981200"/>
-            <a:ext cx="7086600" cy="4000286"/>
+            <a:off x="152400" y="1981200"/>
+            <a:ext cx="7772400" cy="4000286"/>
           </a:xfrm>
           <a:prstGeom prst="roundRect">
             <a:avLst>
@@ -12125,8 +12125,8 @@
         </p:nvSpPr>
         <p:spPr>
           <a:xfrm>
-            <a:off x="152400" y="2743200"/>
-            <a:ext cx="1424846" cy="215444"/>
+            <a:off x="12834" y="2819400"/>
+            <a:ext cx="1424846" cy="430887"/>
           </a:xfrm>
           <a:prstGeom prst="rect">
             <a:avLst/>
@@ -12146,7 +12146,7 @@
                   <a:srgbClr val="0070C0"/>
                 </a:solidFill>
               </a:rPr>
-              <a:t>execute(“delete 1”)</a:t>
+              <a:t>execute(“delete task 1”)</a:t>
             </a:r>
             <a:endParaRPr lang="en-US" sz="1400" dirty="0">
               <a:solidFill>
@@ -12747,7 +12747,7 @@
                   <a:srgbClr val="7030A0"/>
                 </a:solidFill>
               </a:rPr>
-              <a:t>deleteActivity</a:t>
+              <a:t>deleteTask</a:t>
             </a:r>
             <a:r>
               <a:rPr lang="en-US" dirty="0" smtClean="0">
@@ -12814,8 +12814,8 @@
         </p:nvSpPr>
         <p:spPr>
           <a:xfrm>
-            <a:off x="2131905" y="2850922"/>
-            <a:ext cx="1424846" cy="215444"/>
+            <a:off x="1752600" y="2819400"/>
+            <a:ext cx="1830495" cy="215444"/>
           </a:xfrm>
           <a:prstGeom prst="rect">
             <a:avLst/>
@@ -12841,7 +12841,7 @@
           <a:p>
             <a:r>
               <a:rPr lang="en-US" dirty="0" smtClean="0"/>
-              <a:t>parse(“delete 1”)</a:t>
+              <a:t>parse(“delete task 1”)</a:t>
             </a:r>
             <a:endParaRPr lang="en-US" dirty="0"/>
           </a:p>
@@ -15125,8 +15125,8 @@
         </p:nvSpPr>
         <p:spPr>
           <a:xfrm>
-            <a:off x="600941" y="2178243"/>
-            <a:ext cx="8546798" cy="1723618"/>
+            <a:off x="609600" y="1524000"/>
+            <a:ext cx="9356122" cy="2409418"/>
           </a:xfrm>
           <a:prstGeom prst="roundRect">
             <a:avLst>
@@ -16292,16 +16292,13 @@
       <p:cxnSp>
         <p:nvCxnSpPr>
           <p:cNvPr id="70" name="Elbow Connector 122"/>
-          <p:cNvCxnSpPr>
-            <a:stCxn id="74" idx="0"/>
-            <a:endCxn id="73" idx="2"/>
-          </p:cNvCxnSpPr>
+          <p:cNvCxnSpPr/>
           <p:nvPr/>
         </p:nvCxnSpPr>
         <p:spPr>
-          <a:xfrm rot="5400000" flipH="1" flipV="1">
-            <a:off x="8158768" y="2981966"/>
-            <a:ext cx="346798" cy="8519"/>
+          <a:xfrm rot="16200000" flipV="1">
+            <a:off x="7332727" y="2573273"/>
+            <a:ext cx="346798" cy="839052"/>
           </a:xfrm>
           <a:prstGeom prst="bentConnector3">
             <a:avLst>
@@ -16337,9 +16334,9 @@
           <p:nvPr/>
         </p:nvSpPr>
         <p:spPr>
-          <a:xfrm>
-            <a:off x="7706568" y="2466066"/>
-            <a:ext cx="1259718" cy="346760"/>
+          <a:xfrm flipH="1">
+            <a:off x="6781800" y="1752600"/>
+            <a:ext cx="914400" cy="1060226"/>
           </a:xfrm>
           <a:prstGeom prst="rect">
             <a:avLst/>
@@ -16459,6 +16456,194 @@
           <a:prstGeom prst="bentConnector3">
             <a:avLst>
               <a:gd name="adj1" fmla="val 50000"/>
+            </a:avLst>
+          </a:prstGeom>
+          <a:ln w="19050">
+            <a:prstDash val="sysDot"/>
+            <a:headEnd type="none" w="med" len="med"/>
+            <a:tailEnd type="arrow" w="med" len="med"/>
+          </a:ln>
+          <a:effectLst/>
+        </p:spPr>
+        <p:style>
+          <a:lnRef idx="1">
+            <a:schemeClr val="accent6"/>
+          </a:lnRef>
+          <a:fillRef idx="2">
+            <a:schemeClr val="accent6"/>
+          </a:fillRef>
+          <a:effectRef idx="1">
+            <a:schemeClr val="accent6"/>
+          </a:effectRef>
+          <a:fontRef idx="minor">
+            <a:schemeClr val="dk1"/>
+          </a:fontRef>
+        </p:style>
+      </p:cxnSp>
+      <p:cxnSp>
+        <p:nvCxnSpPr>
+          <p:cNvPr id="26" name="Elbow Connector 122"/>
+          <p:cNvCxnSpPr/>
+          <p:nvPr/>
+        </p:nvCxnSpPr>
+        <p:spPr>
+          <a:xfrm rot="5400000" flipH="1" flipV="1">
+            <a:off x="8136661" y="2988539"/>
+            <a:ext cx="346798" cy="8519"/>
+          </a:xfrm>
+          <a:prstGeom prst="bentConnector3">
+            <a:avLst>
+              <a:gd name="adj1" fmla="val 50000"/>
+            </a:avLst>
+          </a:prstGeom>
+          <a:ln w="19050">
+            <a:prstDash val="sysDot"/>
+            <a:headEnd type="none" w="med" len="med"/>
+            <a:tailEnd type="arrow" w="med" len="med"/>
+          </a:ln>
+          <a:effectLst/>
+        </p:spPr>
+        <p:style>
+          <a:lnRef idx="1">
+            <a:schemeClr val="accent6"/>
+          </a:lnRef>
+          <a:fillRef idx="2">
+            <a:schemeClr val="accent6"/>
+          </a:fillRef>
+          <a:effectRef idx="1">
+            <a:schemeClr val="accent6"/>
+          </a:effectRef>
+          <a:fontRef idx="minor">
+            <a:schemeClr val="dk1"/>
+          </a:fontRef>
+        </p:style>
+      </p:cxnSp>
+      <p:sp>
+        <p:nvSpPr>
+          <p:cNvPr id="35" name="Rectangle 8"/>
+          <p:cNvSpPr/>
+          <p:nvPr/>
+        </p:nvSpPr>
+        <p:spPr>
+          <a:xfrm flipH="1">
+            <a:off x="8763000" y="1752600"/>
+            <a:ext cx="914400" cy="1060226"/>
+          </a:xfrm>
+          <a:prstGeom prst="rect">
+            <a:avLst/>
+          </a:prstGeom>
+          <a:ln w="19050"/>
+          <a:effectLst/>
+        </p:spPr>
+        <p:style>
+          <a:lnRef idx="1">
+            <a:schemeClr val="accent6"/>
+          </a:lnRef>
+          <a:fillRef idx="2">
+            <a:schemeClr val="accent6"/>
+          </a:fillRef>
+          <a:effectRef idx="1">
+            <a:schemeClr val="accent6"/>
+          </a:effectRef>
+          <a:fontRef idx="minor">
+            <a:schemeClr val="dk1"/>
+          </a:fontRef>
+        </p:style>
+        <p:txBody>
+          <a:bodyPr rtlCol="0" anchor="ctr"/>
+          <a:lstStyle/>
+          <a:p>
+            <a:pPr algn="ctr"/>
+            <a:r>
+              <a:rPr lang="en-US" sz="1050" b="1" dirty="0" err="1" smtClean="0">
+                <a:solidFill>
+                  <a:schemeClr val="accent6">
+                    <a:lumMod val="75000"/>
+                  </a:schemeClr>
+                </a:solidFill>
+              </a:rPr>
+              <a:t>XmlAdaptedFloatingTask</a:t>
+            </a:r>
+            <a:endParaRPr lang="en-SG" sz="1050" b="1" dirty="0">
+              <a:solidFill>
+                <a:schemeClr val="accent6">
+                  <a:lumMod val="75000"/>
+                </a:schemeClr>
+              </a:solidFill>
+            </a:endParaRPr>
+          </a:p>
+        </p:txBody>
+      </p:sp>
+      <p:sp>
+        <p:nvSpPr>
+          <p:cNvPr id="36" name="Rectangle 8"/>
+          <p:cNvSpPr/>
+          <p:nvPr/>
+        </p:nvSpPr>
+        <p:spPr>
+          <a:xfrm flipH="1">
+            <a:off x="7772400" y="1752600"/>
+            <a:ext cx="914400" cy="1060226"/>
+          </a:xfrm>
+          <a:prstGeom prst="rect">
+            <a:avLst/>
+          </a:prstGeom>
+          <a:ln w="19050"/>
+          <a:effectLst/>
+        </p:spPr>
+        <p:style>
+          <a:lnRef idx="1">
+            <a:schemeClr val="accent6"/>
+          </a:lnRef>
+          <a:fillRef idx="2">
+            <a:schemeClr val="accent6"/>
+          </a:fillRef>
+          <a:effectRef idx="1">
+            <a:schemeClr val="accent6"/>
+          </a:effectRef>
+          <a:fontRef idx="minor">
+            <a:schemeClr val="dk1"/>
+          </a:fontRef>
+        </p:style>
+        <p:txBody>
+          <a:bodyPr rtlCol="0" anchor="ctr"/>
+          <a:lstStyle/>
+          <a:p>
+            <a:pPr algn="ctr"/>
+            <a:r>
+              <a:rPr lang="en-US" sz="1050" b="1" dirty="0" err="1" smtClean="0">
+                <a:solidFill>
+                  <a:schemeClr val="accent6">
+                    <a:lumMod val="75000"/>
+                  </a:schemeClr>
+                </a:solidFill>
+              </a:rPr>
+              <a:t>XmlAdaptedEvent</a:t>
+            </a:r>
+            <a:endParaRPr lang="en-SG" sz="1050" b="1" dirty="0">
+              <a:solidFill>
+                <a:schemeClr val="accent6">
+                  <a:lumMod val="75000"/>
+                </a:schemeClr>
+              </a:solidFill>
+            </a:endParaRPr>
+          </a:p>
+        </p:txBody>
+      </p:sp>
+      <p:cxnSp>
+        <p:nvCxnSpPr>
+          <p:cNvPr id="41" name="Elbow Connector 122"/>
+          <p:cNvCxnSpPr/>
+          <p:nvPr/>
+        </p:nvCxnSpPr>
+        <p:spPr>
+          <a:xfrm rot="5400000" flipH="1" flipV="1">
+            <a:off x="8746261" y="2988539"/>
+            <a:ext cx="346798" cy="8519"/>
+          </a:xfrm>
+          <a:prstGeom prst="bentConnector3">
+            <a:avLst>
+              <a:gd name="adj1" fmla="val 74979"/>
             </a:avLst>
           </a:prstGeom>
           <a:ln w="19050">

</xml_diff>

<commit_message>
Update UiClassDiagram in developer guide
</commit_message>
<xml_diff>
--- a/docs/diagrams/Diagrams(CS2103T - V0.3).pptx
+++ b/docs/diagrams/Diagrams(CS2103T - V0.3).pptx
@@ -216,7 +216,7 @@
           <a:p>
             <a:fld id="{F5CC4B3F-88C1-4FFA-B1B6-F41C21DC6924}" type="datetimeFigureOut">
               <a:rPr lang="en-US" smtClean="0"/>
-              <a:t>10/19/2016</a:t>
+              <a:t>10/20/16</a:t>
             </a:fld>
             <a:endParaRPr lang="en-US"/>
           </a:p>
@@ -665,7 +665,7 @@
           <a:p>
             <a:fld id="{78C97017-6FC3-485B-9764-EAC9E56C1D49}" type="datetimeFigureOut">
               <a:rPr lang="en-US" smtClean="0"/>
-              <a:t>10/19/2016</a:t>
+              <a:t>10/20/16</a:t>
             </a:fld>
             <a:endParaRPr lang="en-US"/>
           </a:p>
@@ -835,7 +835,7 @@
           <a:p>
             <a:fld id="{78C97017-6FC3-485B-9764-EAC9E56C1D49}" type="datetimeFigureOut">
               <a:rPr lang="en-US" smtClean="0"/>
-              <a:t>10/19/2016</a:t>
+              <a:t>10/20/16</a:t>
             </a:fld>
             <a:endParaRPr lang="en-US"/>
           </a:p>
@@ -1015,7 +1015,7 @@
           <a:p>
             <a:fld id="{78C97017-6FC3-485B-9764-EAC9E56C1D49}" type="datetimeFigureOut">
               <a:rPr lang="en-US" smtClean="0"/>
-              <a:t>10/19/2016</a:t>
+              <a:t>10/20/16</a:t>
             </a:fld>
             <a:endParaRPr lang="en-US"/>
           </a:p>
@@ -1185,7 +1185,7 @@
           <a:p>
             <a:fld id="{78C97017-6FC3-485B-9764-EAC9E56C1D49}" type="datetimeFigureOut">
               <a:rPr lang="en-US" smtClean="0"/>
-              <a:t>10/19/2016</a:t>
+              <a:t>10/20/16</a:t>
             </a:fld>
             <a:endParaRPr lang="en-US"/>
           </a:p>
@@ -1431,7 +1431,7 @@
           <a:p>
             <a:fld id="{78C97017-6FC3-485B-9764-EAC9E56C1D49}" type="datetimeFigureOut">
               <a:rPr lang="en-US" smtClean="0"/>
-              <a:t>10/19/2016</a:t>
+              <a:t>10/20/16</a:t>
             </a:fld>
             <a:endParaRPr lang="en-US"/>
           </a:p>
@@ -1719,7 +1719,7 @@
           <a:p>
             <a:fld id="{78C97017-6FC3-485B-9764-EAC9E56C1D49}" type="datetimeFigureOut">
               <a:rPr lang="en-US" smtClean="0"/>
-              <a:t>10/19/2016</a:t>
+              <a:t>10/20/16</a:t>
             </a:fld>
             <a:endParaRPr lang="en-US"/>
           </a:p>
@@ -2141,7 +2141,7 @@
           <a:p>
             <a:fld id="{78C97017-6FC3-485B-9764-EAC9E56C1D49}" type="datetimeFigureOut">
               <a:rPr lang="en-US" smtClean="0"/>
-              <a:t>10/19/2016</a:t>
+              <a:t>10/20/16</a:t>
             </a:fld>
             <a:endParaRPr lang="en-US"/>
           </a:p>
@@ -2259,7 +2259,7 @@
           <a:p>
             <a:fld id="{78C97017-6FC3-485B-9764-EAC9E56C1D49}" type="datetimeFigureOut">
               <a:rPr lang="en-US" smtClean="0"/>
-              <a:t>10/19/2016</a:t>
+              <a:t>10/20/16</a:t>
             </a:fld>
             <a:endParaRPr lang="en-US"/>
           </a:p>
@@ -2354,7 +2354,7 @@
           <a:p>
             <a:fld id="{78C97017-6FC3-485B-9764-EAC9E56C1D49}" type="datetimeFigureOut">
               <a:rPr lang="en-US" smtClean="0"/>
-              <a:t>10/19/2016</a:t>
+              <a:t>10/20/16</a:t>
             </a:fld>
             <a:endParaRPr lang="en-US"/>
           </a:p>
@@ -2631,7 +2631,7 @@
           <a:p>
             <a:fld id="{78C97017-6FC3-485B-9764-EAC9E56C1D49}" type="datetimeFigureOut">
               <a:rPr lang="en-US" smtClean="0"/>
-              <a:t>10/19/2016</a:t>
+              <a:t>10/20/16</a:t>
             </a:fld>
             <a:endParaRPr lang="en-US"/>
           </a:p>
@@ -2884,7 +2884,7 @@
           <a:p>
             <a:fld id="{78C97017-6FC3-485B-9764-EAC9E56C1D49}" type="datetimeFigureOut">
               <a:rPr lang="en-US" smtClean="0"/>
-              <a:t>10/19/2016</a:t>
+              <a:t>10/20/16</a:t>
             </a:fld>
             <a:endParaRPr lang="en-US"/>
           </a:p>
@@ -3097,7 +3097,7 @@
           <a:p>
             <a:fld id="{78C97017-6FC3-485B-9764-EAC9E56C1D49}" type="datetimeFigureOut">
               <a:rPr lang="en-US" smtClean="0"/>
-              <a:t>10/19/2016</a:t>
+              <a:t>10/20/16</a:t>
             </a:fld>
             <a:endParaRPr lang="en-US"/>
           </a:p>
@@ -7559,7 +7559,7 @@
         <p:spPr>
           <a:xfrm>
             <a:off x="1217465" y="1447800"/>
-            <a:ext cx="4917083" cy="3962400"/>
+            <a:ext cx="4917083" cy="4419600"/>
           </a:xfrm>
           <a:prstGeom prst="roundRect">
             <a:avLst>
@@ -8053,7 +8053,7 @@
         </p:nvSpPr>
         <p:spPr>
           <a:xfrm>
-            <a:off x="2592527" y="4563759"/>
+            <a:off x="2580210" y="5064950"/>
             <a:ext cx="1093635" cy="236841"/>
           </a:xfrm>
           <a:prstGeom prst="rect">
@@ -8153,7 +8153,17 @@
                   </a:schemeClr>
                 </a:solidFill>
               </a:rPr>
-              <a:t>TaskListPanel</a:t>
+              <a:t>Activity</a:t>
+            </a:r>
+            <a:r>
+              <a:rPr lang="en-US" sz="1050" b="1" dirty="0" err="1" smtClean="0">
+                <a:solidFill>
+                  <a:schemeClr val="accent3">
+                    <a:lumMod val="75000"/>
+                  </a:schemeClr>
+                </a:solidFill>
+              </a:rPr>
+              <a:t>ListPanel</a:t>
             </a:r>
             <a:endParaRPr lang="en-SG" sz="1050" b="1" dirty="0">
               <a:solidFill>
@@ -8173,8 +8183,8 @@
         </p:nvSpPr>
         <p:spPr>
           <a:xfrm>
-            <a:off x="3839323" y="4228801"/>
-            <a:ext cx="1040906" cy="236841"/>
+            <a:off x="3888295" y="4158733"/>
+            <a:ext cx="1182279" cy="276159"/>
           </a:xfrm>
           <a:prstGeom prst="rect">
             <a:avLst/>
@@ -8206,14 +8216,24 @@
           <a:p>
             <a:pPr algn="ctr"/>
             <a:r>
-              <a:rPr lang="en-US" sz="1050" b="1" dirty="0" err="1" smtClean="0">
+              <a:rPr lang="en-US" sz="1050" b="1" smtClean="0">
                 <a:solidFill>
                   <a:schemeClr val="accent3">
                     <a:lumMod val="75000"/>
                   </a:schemeClr>
                 </a:solidFill>
               </a:rPr>
-              <a:t>ActivityCard</a:t>
+              <a:t>Task</a:t>
+            </a:r>
+            <a:r>
+              <a:rPr lang="en-US" sz="1050" b="1" smtClean="0">
+                <a:solidFill>
+                  <a:schemeClr val="accent3">
+                    <a:lumMod val="75000"/>
+                  </a:schemeClr>
+                </a:solidFill>
+              </a:rPr>
+              <a:t>Card</a:t>
             </a:r>
             <a:endParaRPr lang="en-SG" sz="1050" b="1" dirty="0">
               <a:solidFill>
@@ -8233,7 +8253,7 @@
         </p:nvSpPr>
         <p:spPr>
           <a:xfrm>
-            <a:off x="2592528" y="4966000"/>
+            <a:off x="2619752" y="5446807"/>
             <a:ext cx="1093635" cy="236841"/>
           </a:xfrm>
           <a:prstGeom prst="rect">
@@ -8527,8 +8547,8 @@
         </p:nvCxnSpPr>
         <p:spPr>
           <a:xfrm rot="16200000" flipH="1">
-            <a:off x="1597249" y="3686901"/>
-            <a:ext cx="1814155" cy="176401"/>
+            <a:off x="1340495" y="3943656"/>
+            <a:ext cx="2315346" cy="164084"/>
           </a:xfrm>
           <a:prstGeom prst="bentConnector2">
             <a:avLst/>
@@ -8567,7 +8587,7 @@
         </p:nvCxnSpPr>
         <p:spPr>
           <a:xfrm rot="16200000" flipH="1">
-            <a:off x="1184119" y="3676012"/>
+            <a:off x="1211343" y="4156819"/>
             <a:ext cx="2396440" cy="420377"/>
           </a:xfrm>
           <a:prstGeom prst="bentConnector2">
@@ -8728,8 +8748,8 @@
         </p:nvCxnSpPr>
         <p:spPr>
           <a:xfrm rot="5400000">
-            <a:off x="4174488" y="2991741"/>
-            <a:ext cx="2061222" cy="649740"/>
+            <a:off x="4294866" y="3061709"/>
+            <a:ext cx="2010813" cy="459395"/>
           </a:xfrm>
           <a:prstGeom prst="bentConnector2">
             <a:avLst/>
@@ -8851,8 +8871,8 @@
         </p:nvCxnSpPr>
         <p:spPr>
           <a:xfrm rot="5400000">
-            <a:off x="3409976" y="2562187"/>
-            <a:ext cx="2396180" cy="1843807"/>
+            <a:off x="3153222" y="2806623"/>
+            <a:ext cx="2897371" cy="1856124"/>
           </a:xfrm>
           <a:prstGeom prst="bentConnector2">
             <a:avLst/>
@@ -8892,8 +8912,8 @@
         </p:nvCxnSpPr>
         <p:spPr>
           <a:xfrm rot="5400000">
-            <a:off x="3208856" y="2763307"/>
-            <a:ext cx="2798421" cy="1843806"/>
+            <a:off x="2982064" y="3017323"/>
+            <a:ext cx="3279228" cy="1816582"/>
           </a:xfrm>
           <a:prstGeom prst="bentConnector2">
             <a:avLst/>
@@ -9406,16 +9426,13 @@
       <p:cxnSp>
         <p:nvCxnSpPr>
           <p:cNvPr id="137" name="Elbow Connector 136"/>
-          <p:cNvCxnSpPr>
-            <a:stCxn id="36" idx="2"/>
-            <a:endCxn id="37" idx="1"/>
-          </p:cNvCxnSpPr>
+          <p:cNvCxnSpPr/>
           <p:nvPr/>
         </p:nvCxnSpPr>
         <p:spPr>
           <a:xfrm rot="16200000" flipH="1">
-            <a:off x="3455231" y="3963129"/>
-            <a:ext cx="118421" cy="649763"/>
+            <a:off x="3514751" y="3930731"/>
+            <a:ext cx="48353" cy="698736"/>
           </a:xfrm>
           <a:prstGeom prst="bentConnector2">
             <a:avLst/>
@@ -9447,15 +9464,12 @@
       <p:cxnSp>
         <p:nvCxnSpPr>
           <p:cNvPr id="140" name="Elbow Connector 63"/>
-          <p:cNvCxnSpPr>
-            <a:stCxn id="16" idx="3"/>
-            <a:endCxn id="36" idx="3"/>
-          </p:cNvCxnSpPr>
+          <p:cNvCxnSpPr/>
           <p:nvPr/>
         </p:nvCxnSpPr>
         <p:spPr>
           <a:xfrm rot="5400000">
-            <a:off x="3744037" y="2328556"/>
+            <a:off x="3728592" y="2315812"/>
             <a:ext cx="1828489" cy="1743376"/>
           </a:xfrm>
           <a:prstGeom prst="bentConnector2">
@@ -9755,6 +9769,214 @@
           </a:p>
         </p:txBody>
       </p:sp>
+      <p:sp>
+        <p:nvSpPr>
+          <p:cNvPr id="45" name="Rectangle 11"/>
+          <p:cNvSpPr/>
+          <p:nvPr/>
+        </p:nvSpPr>
+        <p:spPr>
+          <a:xfrm>
+            <a:off x="3912398" y="4462406"/>
+            <a:ext cx="1158176" cy="255400"/>
+          </a:xfrm>
+          <a:prstGeom prst="rect">
+            <a:avLst/>
+          </a:prstGeom>
+          <a:ln w="19050">
+            <a:solidFill>
+              <a:schemeClr val="accent3"/>
+            </a:solidFill>
+          </a:ln>
+          <a:effectLst/>
+        </p:spPr>
+        <p:style>
+          <a:lnRef idx="1">
+            <a:schemeClr val="accent3"/>
+          </a:lnRef>
+          <a:fillRef idx="2">
+            <a:schemeClr val="accent3"/>
+          </a:fillRef>
+          <a:effectRef idx="1">
+            <a:schemeClr val="accent3"/>
+          </a:effectRef>
+          <a:fontRef idx="minor">
+            <a:schemeClr val="dk1"/>
+          </a:fontRef>
+        </p:style>
+        <p:txBody>
+          <a:bodyPr rtlCol="0" anchor="ctr"/>
+          <a:lstStyle/>
+          <a:p>
+            <a:pPr algn="ctr"/>
+            <a:r>
+              <a:rPr lang="en-US" sz="1050" b="1" dirty="0" err="1" smtClean="0">
+                <a:solidFill>
+                  <a:schemeClr val="accent3">
+                    <a:lumMod val="75000"/>
+                  </a:schemeClr>
+                </a:solidFill>
+              </a:rPr>
+              <a:t>Event</a:t>
+            </a:r>
+            <a:r>
+              <a:rPr lang="en-US" sz="1050" b="1" dirty="0" err="1" smtClean="0">
+                <a:solidFill>
+                  <a:schemeClr val="accent3">
+                    <a:lumMod val="75000"/>
+                  </a:schemeClr>
+                </a:solidFill>
+              </a:rPr>
+              <a:t>Card</a:t>
+            </a:r>
+            <a:endParaRPr lang="en-SG" sz="1050" b="1" dirty="0">
+              <a:solidFill>
+                <a:schemeClr val="accent3">
+                  <a:lumMod val="75000"/>
+                </a:schemeClr>
+              </a:solidFill>
+            </a:endParaRPr>
+          </a:p>
+        </p:txBody>
+      </p:sp>
+      <p:sp>
+        <p:nvSpPr>
+          <p:cNvPr id="46" name="Rectangle 11"/>
+          <p:cNvSpPr/>
+          <p:nvPr/>
+        </p:nvSpPr>
+        <p:spPr>
+          <a:xfrm>
+            <a:off x="3912397" y="4768856"/>
+            <a:ext cx="1158177" cy="296094"/>
+          </a:xfrm>
+          <a:prstGeom prst="rect">
+            <a:avLst/>
+          </a:prstGeom>
+          <a:ln w="19050">
+            <a:solidFill>
+              <a:schemeClr val="accent3"/>
+            </a:solidFill>
+          </a:ln>
+          <a:effectLst/>
+        </p:spPr>
+        <p:style>
+          <a:lnRef idx="1">
+            <a:schemeClr val="accent3"/>
+          </a:lnRef>
+          <a:fillRef idx="2">
+            <a:schemeClr val="accent3"/>
+          </a:fillRef>
+          <a:effectRef idx="1">
+            <a:schemeClr val="accent3"/>
+          </a:effectRef>
+          <a:fontRef idx="minor">
+            <a:schemeClr val="dk1"/>
+          </a:fontRef>
+        </p:style>
+        <p:txBody>
+          <a:bodyPr rtlCol="0" anchor="ctr"/>
+          <a:lstStyle/>
+          <a:p>
+            <a:pPr algn="ctr"/>
+            <a:r>
+              <a:rPr lang="en-US" sz="1050" b="1" dirty="0" err="1" smtClean="0">
+                <a:solidFill>
+                  <a:schemeClr val="accent3">
+                    <a:lumMod val="75000"/>
+                  </a:schemeClr>
+                </a:solidFill>
+              </a:rPr>
+              <a:t>FloatingTaskCard</a:t>
+            </a:r>
+            <a:endParaRPr lang="en-SG" sz="1050" b="1" dirty="0">
+              <a:solidFill>
+                <a:schemeClr val="accent3">
+                  <a:lumMod val="75000"/>
+                </a:schemeClr>
+              </a:solidFill>
+            </a:endParaRPr>
+          </a:p>
+        </p:txBody>
+      </p:sp>
+      <p:cxnSp>
+        <p:nvCxnSpPr>
+          <p:cNvPr id="52" name="Elbow Connector 51"/>
+          <p:cNvCxnSpPr>
+            <a:stCxn id="36" idx="2"/>
+          </p:cNvCxnSpPr>
+          <p:nvPr/>
+        </p:nvCxnSpPr>
+        <p:spPr>
+          <a:xfrm rot="16200000" flipH="1">
+            <a:off x="3370984" y="4047377"/>
+            <a:ext cx="352025" cy="714872"/>
+          </a:xfrm>
+          <a:prstGeom prst="bentConnector2">
+            <a:avLst/>
+          </a:prstGeom>
+          <a:ln w="19050">
+            <a:solidFill>
+              <a:schemeClr val="accent3"/>
+            </a:solidFill>
+            <a:headEnd type="none" w="med" len="med"/>
+            <a:tailEnd type="arrow" w="med" len="med"/>
+          </a:ln>
+          <a:effectLst/>
+        </p:spPr>
+        <p:style>
+          <a:lnRef idx="1">
+            <a:schemeClr val="accent2"/>
+          </a:lnRef>
+          <a:fillRef idx="2">
+            <a:schemeClr val="accent2"/>
+          </a:fillRef>
+          <a:effectRef idx="1">
+            <a:schemeClr val="accent2"/>
+          </a:effectRef>
+          <a:fontRef idx="minor">
+            <a:schemeClr val="dk1"/>
+          </a:fontRef>
+        </p:style>
+      </p:cxnSp>
+      <p:cxnSp>
+        <p:nvCxnSpPr>
+          <p:cNvPr id="54" name="Elbow Connector 53"/>
+          <p:cNvCxnSpPr/>
+          <p:nvPr/>
+        </p:nvCxnSpPr>
+        <p:spPr>
+          <a:xfrm rot="16200000" flipH="1">
+            <a:off x="3370985" y="4351778"/>
+            <a:ext cx="352025" cy="714872"/>
+          </a:xfrm>
+          <a:prstGeom prst="bentConnector2">
+            <a:avLst/>
+          </a:prstGeom>
+          <a:ln w="19050">
+            <a:solidFill>
+              <a:schemeClr val="accent3"/>
+            </a:solidFill>
+            <a:headEnd type="none" w="med" len="med"/>
+            <a:tailEnd type="arrow" w="med" len="med"/>
+          </a:ln>
+          <a:effectLst/>
+        </p:spPr>
+        <p:style>
+          <a:lnRef idx="1">
+            <a:schemeClr val="accent2"/>
+          </a:lnRef>
+          <a:fillRef idx="2">
+            <a:schemeClr val="accent2"/>
+          </a:fillRef>
+          <a:effectRef idx="1">
+            <a:schemeClr val="accent2"/>
+          </a:effectRef>
+          <a:fontRef idx="minor">
+            <a:schemeClr val="dk1"/>
+          </a:fontRef>
+        </p:style>
+      </p:cxnSp>
     </p:spTree>
     <p:extLst>
       <p:ext uri="{BB962C8B-B14F-4D97-AF65-F5344CB8AC3E}">

</xml_diff>

<commit_message>
Updated developer guide for UI component and parts of logic component
</commit_message>
<xml_diff>
--- a/docs/diagrams/Diagrams(CS2103T - V0.3).pptx
+++ b/docs/diagrams/Diagrams(CS2103T - V0.3).pptx
@@ -216,7 +216,7 @@
           <a:p>
             <a:fld id="{F5CC4B3F-88C1-4FFA-B1B6-F41C21DC6924}" type="datetimeFigureOut">
               <a:rPr lang="en-US" smtClean="0"/>
-              <a:t>10/20/16</a:t>
+              <a:t>10/30/16</a:t>
             </a:fld>
             <a:endParaRPr lang="en-US"/>
           </a:p>
@@ -665,7 +665,7 @@
           <a:p>
             <a:fld id="{78C97017-6FC3-485B-9764-EAC9E56C1D49}" type="datetimeFigureOut">
               <a:rPr lang="en-US" smtClean="0"/>
-              <a:t>10/20/16</a:t>
+              <a:t>10/30/16</a:t>
             </a:fld>
             <a:endParaRPr lang="en-US"/>
           </a:p>
@@ -835,7 +835,7 @@
           <a:p>
             <a:fld id="{78C97017-6FC3-485B-9764-EAC9E56C1D49}" type="datetimeFigureOut">
               <a:rPr lang="en-US" smtClean="0"/>
-              <a:t>10/20/16</a:t>
+              <a:t>10/30/16</a:t>
             </a:fld>
             <a:endParaRPr lang="en-US"/>
           </a:p>
@@ -1015,7 +1015,7 @@
           <a:p>
             <a:fld id="{78C97017-6FC3-485B-9764-EAC9E56C1D49}" type="datetimeFigureOut">
               <a:rPr lang="en-US" smtClean="0"/>
-              <a:t>10/20/16</a:t>
+              <a:t>10/30/16</a:t>
             </a:fld>
             <a:endParaRPr lang="en-US"/>
           </a:p>
@@ -1185,7 +1185,7 @@
           <a:p>
             <a:fld id="{78C97017-6FC3-485B-9764-EAC9E56C1D49}" type="datetimeFigureOut">
               <a:rPr lang="en-US" smtClean="0"/>
-              <a:t>10/20/16</a:t>
+              <a:t>10/30/16</a:t>
             </a:fld>
             <a:endParaRPr lang="en-US"/>
           </a:p>
@@ -1431,7 +1431,7 @@
           <a:p>
             <a:fld id="{78C97017-6FC3-485B-9764-EAC9E56C1D49}" type="datetimeFigureOut">
               <a:rPr lang="en-US" smtClean="0"/>
-              <a:t>10/20/16</a:t>
+              <a:t>10/30/16</a:t>
             </a:fld>
             <a:endParaRPr lang="en-US"/>
           </a:p>
@@ -1719,7 +1719,7 @@
           <a:p>
             <a:fld id="{78C97017-6FC3-485B-9764-EAC9E56C1D49}" type="datetimeFigureOut">
               <a:rPr lang="en-US" smtClean="0"/>
-              <a:t>10/20/16</a:t>
+              <a:t>10/30/16</a:t>
             </a:fld>
             <a:endParaRPr lang="en-US"/>
           </a:p>
@@ -2141,7 +2141,7 @@
           <a:p>
             <a:fld id="{78C97017-6FC3-485B-9764-EAC9E56C1D49}" type="datetimeFigureOut">
               <a:rPr lang="en-US" smtClean="0"/>
-              <a:t>10/20/16</a:t>
+              <a:t>10/30/16</a:t>
             </a:fld>
             <a:endParaRPr lang="en-US"/>
           </a:p>
@@ -2259,7 +2259,7 @@
           <a:p>
             <a:fld id="{78C97017-6FC3-485B-9764-EAC9E56C1D49}" type="datetimeFigureOut">
               <a:rPr lang="en-US" smtClean="0"/>
-              <a:t>10/20/16</a:t>
+              <a:t>10/30/16</a:t>
             </a:fld>
             <a:endParaRPr lang="en-US"/>
           </a:p>
@@ -2354,7 +2354,7 @@
           <a:p>
             <a:fld id="{78C97017-6FC3-485B-9764-EAC9E56C1D49}" type="datetimeFigureOut">
               <a:rPr lang="en-US" smtClean="0"/>
-              <a:t>10/20/16</a:t>
+              <a:t>10/30/16</a:t>
             </a:fld>
             <a:endParaRPr lang="en-US"/>
           </a:p>
@@ -2631,7 +2631,7 @@
           <a:p>
             <a:fld id="{78C97017-6FC3-485B-9764-EAC9E56C1D49}" type="datetimeFigureOut">
               <a:rPr lang="en-US" smtClean="0"/>
-              <a:t>10/20/16</a:t>
+              <a:t>10/30/16</a:t>
             </a:fld>
             <a:endParaRPr lang="en-US"/>
           </a:p>
@@ -2884,7 +2884,7 @@
           <a:p>
             <a:fld id="{78C97017-6FC3-485B-9764-EAC9E56C1D49}" type="datetimeFigureOut">
               <a:rPr lang="en-US" smtClean="0"/>
-              <a:t>10/20/16</a:t>
+              <a:t>10/30/16</a:t>
             </a:fld>
             <a:endParaRPr lang="en-US"/>
           </a:p>
@@ -3097,7 +3097,7 @@
           <a:p>
             <a:fld id="{78C97017-6FC3-485B-9764-EAC9E56C1D49}" type="datetimeFigureOut">
               <a:rPr lang="en-US" smtClean="0"/>
-              <a:t>10/20/16</a:t>
+              <a:t>10/30/16</a:t>
             </a:fld>
             <a:endParaRPr lang="en-US"/>
           </a:p>
@@ -7987,13 +7987,13 @@
       </p:sp>
       <p:sp>
         <p:nvSpPr>
-          <p:cNvPr id="34" name="Rectangle 11"/>
+          <p:cNvPr id="35" name="Rectangle 11"/>
           <p:cNvSpPr/>
           <p:nvPr/>
         </p:nvSpPr>
         <p:spPr>
           <a:xfrm>
-            <a:off x="2592528" y="3649359"/>
+            <a:off x="2580210" y="5064950"/>
             <a:ext cx="1093635" cy="236841"/>
           </a:xfrm>
           <a:prstGeom prst="rect">
@@ -8033,7 +8033,7 @@
                   </a:schemeClr>
                 </a:solidFill>
               </a:rPr>
-              <a:t>BrowserPanel</a:t>
+              <a:t>StatusBarFooter</a:t>
             </a:r>
             <a:endParaRPr lang="en-SG" sz="1050" b="1" dirty="0">
               <a:solidFill>
@@ -8047,14 +8047,14 @@
       </p:sp>
       <p:sp>
         <p:nvSpPr>
-          <p:cNvPr id="35" name="Rectangle 11"/>
+          <p:cNvPr id="36" name="Rectangle 11"/>
           <p:cNvSpPr/>
           <p:nvPr/>
         </p:nvSpPr>
         <p:spPr>
           <a:xfrm>
-            <a:off x="2580210" y="5064950"/>
-            <a:ext cx="1093635" cy="236841"/>
+            <a:off x="2592526" y="4000177"/>
+            <a:ext cx="1194067" cy="228624"/>
           </a:xfrm>
           <a:prstGeom prst="rect">
             <a:avLst/>
@@ -8086,14 +8086,14 @@
           <a:p>
             <a:pPr algn="ctr"/>
             <a:r>
-              <a:rPr lang="en-US" sz="1050" b="1" dirty="0" err="1">
+              <a:rPr lang="en-US" sz="1050" b="1" dirty="0" err="1" smtClean="0">
                 <a:solidFill>
                   <a:schemeClr val="accent3">
                     <a:lumMod val="75000"/>
                   </a:schemeClr>
                 </a:solidFill>
               </a:rPr>
-              <a:t>StatusBarFooter</a:t>
+              <a:t>ActivityListPanel</a:t>
             </a:r>
             <a:endParaRPr lang="en-SG" sz="1050" b="1" dirty="0">
               <a:solidFill>
@@ -8107,14 +8107,14 @@
       </p:sp>
       <p:sp>
         <p:nvSpPr>
-          <p:cNvPr id="36" name="Rectangle 11"/>
+          <p:cNvPr id="37" name="Rectangle 11"/>
           <p:cNvSpPr/>
           <p:nvPr/>
         </p:nvSpPr>
         <p:spPr>
           <a:xfrm>
-            <a:off x="2592526" y="4000177"/>
-            <a:ext cx="1194067" cy="228624"/>
+            <a:off x="3888295" y="4158733"/>
+            <a:ext cx="1182279" cy="276159"/>
           </a:xfrm>
           <a:prstGeom prst="rect">
             <a:avLst/>
@@ -8146,24 +8146,14 @@
           <a:p>
             <a:pPr algn="ctr"/>
             <a:r>
-              <a:rPr lang="en-US" sz="1050" b="1" dirty="0" err="1" smtClean="0">
+              <a:rPr lang="en-US" sz="1050" b="1" smtClean="0">
                 <a:solidFill>
                   <a:schemeClr val="accent3">
                     <a:lumMod val="75000"/>
                   </a:schemeClr>
                 </a:solidFill>
               </a:rPr>
-              <a:t>Activity</a:t>
-            </a:r>
-            <a:r>
-              <a:rPr lang="en-US" sz="1050" b="1" dirty="0" err="1" smtClean="0">
-                <a:solidFill>
-                  <a:schemeClr val="accent3">
-                    <a:lumMod val="75000"/>
-                  </a:schemeClr>
-                </a:solidFill>
-              </a:rPr>
-              <a:t>ListPanel</a:t>
+              <a:t>TaskCard</a:t>
             </a:r>
             <a:endParaRPr lang="en-SG" sz="1050" b="1" dirty="0">
               <a:solidFill>
@@ -8177,14 +8167,14 @@
       </p:sp>
       <p:sp>
         <p:nvSpPr>
-          <p:cNvPr id="37" name="Rectangle 11"/>
+          <p:cNvPr id="38" name="Rectangle 11"/>
           <p:cNvSpPr/>
           <p:nvPr/>
         </p:nvSpPr>
         <p:spPr>
           <a:xfrm>
-            <a:off x="3888295" y="4158733"/>
-            <a:ext cx="1182279" cy="276159"/>
+            <a:off x="2619752" y="5446807"/>
+            <a:ext cx="1093635" cy="236841"/>
           </a:xfrm>
           <a:prstGeom prst="rect">
             <a:avLst/>
@@ -8216,24 +8206,14 @@
           <a:p>
             <a:pPr algn="ctr"/>
             <a:r>
-              <a:rPr lang="en-US" sz="1050" b="1" smtClean="0">
+              <a:rPr lang="en-US" sz="1050" b="1" dirty="0" err="1">
                 <a:solidFill>
                   <a:schemeClr val="accent3">
                     <a:lumMod val="75000"/>
                   </a:schemeClr>
                 </a:solidFill>
               </a:rPr>
-              <a:t>Task</a:t>
-            </a:r>
-            <a:r>
-              <a:rPr lang="en-US" sz="1050" b="1" smtClean="0">
-                <a:solidFill>
-                  <a:schemeClr val="accent3">
-                    <a:lumMod val="75000"/>
-                  </a:schemeClr>
-                </a:solidFill>
-              </a:rPr>
-              <a:t>Card</a:t>
+              <a:t>HelpWindow</a:t>
             </a:r>
             <a:endParaRPr lang="en-SG" sz="1050" b="1" dirty="0">
               <a:solidFill>
@@ -8247,14 +8227,103 @@
       </p:sp>
       <p:sp>
         <p:nvSpPr>
-          <p:cNvPr id="38" name="Rectangle 11"/>
+          <p:cNvPr id="39" name="Flowchart: Decision 38"/>
           <p:cNvSpPr/>
           <p:nvPr/>
         </p:nvSpPr>
         <p:spPr>
           <a:xfrm>
-            <a:off x="2619752" y="5446807"/>
-            <a:ext cx="1093635" cy="236841"/>
+            <a:off x="2324548" y="2706452"/>
+            <a:ext cx="183156" cy="161573"/>
+          </a:xfrm>
+          <a:prstGeom prst="flowChartDecision">
+            <a:avLst/>
+          </a:prstGeom>
+          <a:solidFill>
+            <a:schemeClr val="accent3"/>
+          </a:solidFill>
+          <a:ln>
+            <a:solidFill>
+              <a:schemeClr val="accent3"/>
+            </a:solidFill>
+          </a:ln>
+        </p:spPr>
+        <p:style>
+          <a:lnRef idx="2">
+            <a:schemeClr val="accent1">
+              <a:shade val="50000"/>
+            </a:schemeClr>
+          </a:lnRef>
+          <a:fillRef idx="1">
+            <a:schemeClr val="accent1"/>
+          </a:fillRef>
+          <a:effectRef idx="0">
+            <a:schemeClr val="accent1"/>
+          </a:effectRef>
+          <a:fontRef idx="minor">
+            <a:schemeClr val="lt1"/>
+          </a:fontRef>
+        </p:style>
+        <p:txBody>
+          <a:bodyPr rtlCol="0" anchor="ctr"/>
+          <a:lstStyle/>
+          <a:p>
+            <a:pPr algn="ctr"/>
+            <a:endParaRPr lang="en-SG"/>
+          </a:p>
+        </p:txBody>
+      </p:sp>
+      <p:cxnSp>
+        <p:nvCxnSpPr>
+          <p:cNvPr id="40" name="Elbow Connector 63"/>
+          <p:cNvCxnSpPr>
+            <a:stCxn id="39" idx="2"/>
+            <a:endCxn id="3" idx="1"/>
+          </p:cNvCxnSpPr>
+          <p:nvPr/>
+        </p:nvCxnSpPr>
+        <p:spPr>
+          <a:xfrm rot="16200000" flipH="1">
+            <a:off x="2289549" y="2994602"/>
+            <a:ext cx="429556" cy="176402"/>
+          </a:xfrm>
+          <a:prstGeom prst="bentConnector2">
+            <a:avLst/>
+          </a:prstGeom>
+          <a:ln w="19050">
+            <a:solidFill>
+              <a:schemeClr val="accent3"/>
+            </a:solidFill>
+            <a:headEnd type="none" w="med" len="med"/>
+            <a:tailEnd type="arrow" w="med" len="med"/>
+          </a:ln>
+          <a:effectLst/>
+        </p:spPr>
+        <p:style>
+          <a:lnRef idx="1">
+            <a:schemeClr val="accent2"/>
+          </a:lnRef>
+          <a:fillRef idx="2">
+            <a:schemeClr val="accent2"/>
+          </a:fillRef>
+          <a:effectRef idx="1">
+            <a:schemeClr val="accent2"/>
+          </a:effectRef>
+          <a:fontRef idx="minor">
+            <a:schemeClr val="dk1"/>
+          </a:fontRef>
+        </p:style>
+      </p:cxnSp>
+      <p:sp>
+        <p:nvSpPr>
+          <p:cNvPr id="43" name="Rectangle 11"/>
+          <p:cNvSpPr/>
+          <p:nvPr/>
+        </p:nvSpPr>
+        <p:spPr>
+          <a:xfrm>
+            <a:off x="3759694" y="3416961"/>
+            <a:ext cx="1040906" cy="236841"/>
           </a:xfrm>
           <a:prstGeom prst="rect">
             <a:avLst/>
@@ -8293,7 +8362,7 @@
                   </a:schemeClr>
                 </a:solidFill>
               </a:rPr>
-              <a:t>HelpWindow</a:t>
+              <a:t>ResultsDisplay</a:t>
             </a:r>
             <a:endParaRPr lang="en-SG" sz="1050" b="1" dirty="0">
               <a:solidFill>
@@ -8305,196 +8374,6 @@
           </a:p>
         </p:txBody>
       </p:sp>
-      <p:sp>
-        <p:nvSpPr>
-          <p:cNvPr id="39" name="Flowchart: Decision 38"/>
-          <p:cNvSpPr/>
-          <p:nvPr/>
-        </p:nvSpPr>
-        <p:spPr>
-          <a:xfrm>
-            <a:off x="2324548" y="2706452"/>
-            <a:ext cx="183156" cy="161573"/>
-          </a:xfrm>
-          <a:prstGeom prst="flowChartDecision">
-            <a:avLst/>
-          </a:prstGeom>
-          <a:solidFill>
-            <a:schemeClr val="accent3"/>
-          </a:solidFill>
-          <a:ln>
-            <a:solidFill>
-              <a:schemeClr val="accent3"/>
-            </a:solidFill>
-          </a:ln>
-        </p:spPr>
-        <p:style>
-          <a:lnRef idx="2">
-            <a:schemeClr val="accent1">
-              <a:shade val="50000"/>
-            </a:schemeClr>
-          </a:lnRef>
-          <a:fillRef idx="1">
-            <a:schemeClr val="accent1"/>
-          </a:fillRef>
-          <a:effectRef idx="0">
-            <a:schemeClr val="accent1"/>
-          </a:effectRef>
-          <a:fontRef idx="minor">
-            <a:schemeClr val="lt1"/>
-          </a:fontRef>
-        </p:style>
-        <p:txBody>
-          <a:bodyPr rtlCol="0" anchor="ctr"/>
-          <a:lstStyle/>
-          <a:p>
-            <a:pPr algn="ctr"/>
-            <a:endParaRPr lang="en-SG"/>
-          </a:p>
-        </p:txBody>
-      </p:sp>
-      <p:cxnSp>
-        <p:nvCxnSpPr>
-          <p:cNvPr id="40" name="Elbow Connector 63"/>
-          <p:cNvCxnSpPr>
-            <a:stCxn id="39" idx="2"/>
-            <a:endCxn id="3" idx="1"/>
-          </p:cNvCxnSpPr>
-          <p:nvPr/>
-        </p:nvCxnSpPr>
-        <p:spPr>
-          <a:xfrm rot="16200000" flipH="1">
-            <a:off x="2289549" y="2994602"/>
-            <a:ext cx="429556" cy="176402"/>
-          </a:xfrm>
-          <a:prstGeom prst="bentConnector2">
-            <a:avLst/>
-          </a:prstGeom>
-          <a:ln w="19050">
-            <a:solidFill>
-              <a:schemeClr val="accent3"/>
-            </a:solidFill>
-            <a:headEnd type="none" w="med" len="med"/>
-            <a:tailEnd type="arrow" w="med" len="med"/>
-          </a:ln>
-          <a:effectLst/>
-        </p:spPr>
-        <p:style>
-          <a:lnRef idx="1">
-            <a:schemeClr val="accent2"/>
-          </a:lnRef>
-          <a:fillRef idx="2">
-            <a:schemeClr val="accent2"/>
-          </a:fillRef>
-          <a:effectRef idx="1">
-            <a:schemeClr val="accent2"/>
-          </a:effectRef>
-          <a:fontRef idx="minor">
-            <a:schemeClr val="dk1"/>
-          </a:fontRef>
-        </p:style>
-      </p:cxnSp>
-      <p:sp>
-        <p:nvSpPr>
-          <p:cNvPr id="43" name="Rectangle 11"/>
-          <p:cNvSpPr/>
-          <p:nvPr/>
-        </p:nvSpPr>
-        <p:spPr>
-          <a:xfrm>
-            <a:off x="3759694" y="3416961"/>
-            <a:ext cx="1040906" cy="236841"/>
-          </a:xfrm>
-          <a:prstGeom prst="rect">
-            <a:avLst/>
-          </a:prstGeom>
-          <a:ln w="19050">
-            <a:solidFill>
-              <a:schemeClr val="accent3"/>
-            </a:solidFill>
-          </a:ln>
-          <a:effectLst/>
-        </p:spPr>
-        <p:style>
-          <a:lnRef idx="1">
-            <a:schemeClr val="accent3"/>
-          </a:lnRef>
-          <a:fillRef idx="2">
-            <a:schemeClr val="accent3"/>
-          </a:fillRef>
-          <a:effectRef idx="1">
-            <a:schemeClr val="accent3"/>
-          </a:effectRef>
-          <a:fontRef idx="minor">
-            <a:schemeClr val="dk1"/>
-          </a:fontRef>
-        </p:style>
-        <p:txBody>
-          <a:bodyPr rtlCol="0" anchor="ctr"/>
-          <a:lstStyle/>
-          <a:p>
-            <a:pPr algn="ctr"/>
-            <a:r>
-              <a:rPr lang="en-US" sz="1050" b="1" dirty="0" err="1">
-                <a:solidFill>
-                  <a:schemeClr val="accent3">
-                    <a:lumMod val="75000"/>
-                  </a:schemeClr>
-                </a:solidFill>
-              </a:rPr>
-              <a:t>ResultsDisplay</a:t>
-            </a:r>
-            <a:endParaRPr lang="en-SG" sz="1050" b="1" dirty="0">
-              <a:solidFill>
-                <a:schemeClr val="accent3">
-                  <a:lumMod val="75000"/>
-                </a:schemeClr>
-              </a:solidFill>
-            </a:endParaRPr>
-          </a:p>
-        </p:txBody>
-      </p:sp>
-      <p:cxnSp>
-        <p:nvCxnSpPr>
-          <p:cNvPr id="44" name="Elbow Connector 63"/>
-          <p:cNvCxnSpPr>
-            <a:stCxn id="39" idx="2"/>
-            <a:endCxn id="34" idx="1"/>
-          </p:cNvCxnSpPr>
-          <p:nvPr/>
-        </p:nvCxnSpPr>
-        <p:spPr>
-          <a:xfrm rot="16200000" flipH="1">
-            <a:off x="2054450" y="3229701"/>
-            <a:ext cx="899755" cy="176402"/>
-          </a:xfrm>
-          <a:prstGeom prst="bentConnector2">
-            <a:avLst/>
-          </a:prstGeom>
-          <a:ln w="19050">
-            <a:solidFill>
-              <a:schemeClr val="accent3"/>
-            </a:solidFill>
-            <a:headEnd type="none" w="med" len="med"/>
-            <a:tailEnd type="arrow" w="med" len="med"/>
-          </a:ln>
-          <a:effectLst/>
-        </p:spPr>
-        <p:style>
-          <a:lnRef idx="1">
-            <a:schemeClr val="accent2"/>
-          </a:lnRef>
-          <a:fillRef idx="2">
-            <a:schemeClr val="accent2"/>
-          </a:fillRef>
-          <a:effectRef idx="1">
-            <a:schemeClr val="accent2"/>
-          </a:effectRef>
-          <a:fontRef idx="minor">
-            <a:schemeClr val="dk1"/>
-          </a:fontRef>
-        </p:style>
-      </p:cxnSp>
       <p:cxnSp>
         <p:nvCxnSpPr>
           <p:cNvPr id="47" name="Elbow Connector 63"/>
@@ -8587,8 +8466,8 @@
         </p:nvCxnSpPr>
         <p:spPr>
           <a:xfrm rot="16200000" flipH="1">
-            <a:off x="1211343" y="4156819"/>
-            <a:ext cx="2396440" cy="420377"/>
+            <a:off x="2313964" y="5259440"/>
+            <a:ext cx="407950" cy="203626"/>
           </a:xfrm>
           <a:prstGeom prst="bentConnector2">
             <a:avLst/>
@@ -8740,60 +8619,18 @@
       <p:cxnSp>
         <p:nvCxnSpPr>
           <p:cNvPr id="77" name="Elbow Connector 63"/>
-          <p:cNvCxnSpPr>
-            <a:stCxn id="16" idx="3"/>
-            <a:endCxn id="37" idx="3"/>
-          </p:cNvCxnSpPr>
+          <p:cNvCxnSpPr/>
           <p:nvPr/>
         </p:nvCxnSpPr>
         <p:spPr>
-          <a:xfrm rot="5400000">
-            <a:off x="4294866" y="3061709"/>
-            <a:ext cx="2010813" cy="459395"/>
-          </a:xfrm>
-          <a:prstGeom prst="bentConnector2">
-            <a:avLst/>
-          </a:prstGeom>
-          <a:ln w="6350">
-            <a:solidFill>
-              <a:schemeClr val="accent3"/>
-            </a:solidFill>
-            <a:headEnd type="none" w="med" len="med"/>
-            <a:tailEnd type="none" w="med" len="med"/>
-          </a:ln>
-          <a:effectLst/>
-        </p:spPr>
-        <p:style>
-          <a:lnRef idx="1">
-            <a:schemeClr val="accent2"/>
-          </a:lnRef>
-          <a:fillRef idx="2">
-            <a:schemeClr val="accent2"/>
-          </a:fillRef>
-          <a:effectRef idx="1">
-            <a:schemeClr val="accent2"/>
-          </a:effectRef>
-          <a:fontRef idx="minor">
-            <a:schemeClr val="dk1"/>
-          </a:fontRef>
-        </p:style>
-      </p:cxnSp>
-      <p:cxnSp>
-        <p:nvCxnSpPr>
-          <p:cNvPr id="82" name="Elbow Connector 63"/>
-          <p:cNvCxnSpPr>
-            <a:stCxn id="16" idx="3"/>
-            <a:endCxn id="34" idx="3"/>
-          </p:cNvCxnSpPr>
-          <p:nvPr/>
-        </p:nvCxnSpPr>
-        <p:spPr>
-          <a:xfrm rot="5400000">
-            <a:off x="3867176" y="2104987"/>
-            <a:ext cx="1481780" cy="1843806"/>
-          </a:xfrm>
-          <a:prstGeom prst="bentConnector2">
-            <a:avLst/>
+          <a:xfrm rot="10800000">
+            <a:off x="5065631" y="4339330"/>
+            <a:ext cx="464338" cy="34"/>
+          </a:xfrm>
+          <a:prstGeom prst="bentConnector3">
+            <a:avLst>
+              <a:gd name="adj1" fmla="val 50000"/>
+            </a:avLst>
           </a:prstGeom>
           <a:ln w="6350">
             <a:solidFill>
@@ -9817,17 +9654,7 @@
                   </a:schemeClr>
                 </a:solidFill>
               </a:rPr>
-              <a:t>Event</a:t>
-            </a:r>
-            <a:r>
-              <a:rPr lang="en-US" sz="1050" b="1" dirty="0" err="1" smtClean="0">
-                <a:solidFill>
-                  <a:schemeClr val="accent3">
-                    <a:lumMod val="75000"/>
-                  </a:schemeClr>
-                </a:solidFill>
-              </a:rPr>
-              <a:t>Card</a:t>
+              <a:t>EventCard</a:t>
             </a:r>
             <a:endParaRPr lang="en-SG" sz="1050" b="1" dirty="0">
               <a:solidFill>
@@ -9959,6 +9786,250 @@
             </a:solidFill>
             <a:headEnd type="none" w="med" len="med"/>
             <a:tailEnd type="arrow" w="med" len="med"/>
+          </a:ln>
+          <a:effectLst/>
+        </p:spPr>
+        <p:style>
+          <a:lnRef idx="1">
+            <a:schemeClr val="accent2"/>
+          </a:lnRef>
+          <a:fillRef idx="2">
+            <a:schemeClr val="accent2"/>
+          </a:fillRef>
+          <a:effectRef idx="1">
+            <a:schemeClr val="accent2"/>
+          </a:effectRef>
+          <a:fontRef idx="minor">
+            <a:schemeClr val="dk1"/>
+          </a:fontRef>
+        </p:style>
+      </p:cxnSp>
+      <p:sp>
+        <p:nvSpPr>
+          <p:cNvPr id="49" name="Freeform 48"/>
+          <p:cNvSpPr/>
+          <p:nvPr/>
+        </p:nvSpPr>
+        <p:spPr>
+          <a:xfrm flipV="1">
+            <a:off x="5087502" y="4959521"/>
+            <a:ext cx="1656978" cy="45719"/>
+          </a:xfrm>
+          <a:custGeom>
+            <a:avLst/>
+            <a:gdLst>
+              <a:gd name="connsiteX0" fmla="*/ 0 w 3048000"/>
+              <a:gd name="connsiteY0" fmla="*/ 203200 h 203200"/>
+              <a:gd name="connsiteX1" fmla="*/ 221673 w 3048000"/>
+              <a:gd name="connsiteY1" fmla="*/ 0 h 203200"/>
+              <a:gd name="connsiteX2" fmla="*/ 3048000 w 3048000"/>
+              <a:gd name="connsiteY2" fmla="*/ 0 h 203200"/>
+            </a:gdLst>
+            <a:ahLst/>
+            <a:cxnLst>
+              <a:cxn ang="0">
+                <a:pos x="connsiteX0" y="connsiteY0"/>
+              </a:cxn>
+              <a:cxn ang="0">
+                <a:pos x="connsiteX1" y="connsiteY1"/>
+              </a:cxn>
+              <a:cxn ang="0">
+                <a:pos x="connsiteX2" y="connsiteY2"/>
+              </a:cxn>
+            </a:cxnLst>
+            <a:rect l="l" t="t" r="r" b="b"/>
+            <a:pathLst>
+              <a:path w="3048000" h="203200">
+                <a:moveTo>
+                  <a:pt x="0" y="203200"/>
+                </a:moveTo>
+                <a:lnTo>
+                  <a:pt x="221673" y="0"/>
+                </a:lnTo>
+                <a:lnTo>
+                  <a:pt x="3048000" y="0"/>
+                </a:lnTo>
+              </a:path>
+            </a:pathLst>
+          </a:custGeom>
+          <a:noFill/>
+          <a:ln w="19050">
+            <a:solidFill>
+              <a:schemeClr val="accent3"/>
+            </a:solidFill>
+            <a:prstDash val="sysDot"/>
+            <a:headEnd type="none" w="med" len="med"/>
+            <a:tailEnd type="arrow" w="med" len="med"/>
+          </a:ln>
+          <a:effectLst/>
+        </p:spPr>
+        <p:style>
+          <a:lnRef idx="1">
+            <a:schemeClr val="accent2"/>
+          </a:lnRef>
+          <a:fillRef idx="2">
+            <a:schemeClr val="accent2"/>
+          </a:fillRef>
+          <a:effectRef idx="1">
+            <a:schemeClr val="accent2"/>
+          </a:effectRef>
+          <a:fontRef idx="minor">
+            <a:schemeClr val="dk1"/>
+          </a:fontRef>
+        </p:style>
+        <p:txBody>
+          <a:bodyPr rtlCol="0" anchor="ctr"/>
+          <a:lstStyle/>
+          <a:p>
+            <a:pPr algn="ctr"/>
+            <a:endParaRPr lang="en-SG"/>
+          </a:p>
+        </p:txBody>
+      </p:sp>
+      <p:sp>
+        <p:nvSpPr>
+          <p:cNvPr id="51" name="Freeform 50"/>
+          <p:cNvSpPr/>
+          <p:nvPr/>
+        </p:nvSpPr>
+        <p:spPr>
+          <a:xfrm>
+            <a:off x="5073182" y="4223007"/>
+            <a:ext cx="1683811" cy="45719"/>
+          </a:xfrm>
+          <a:custGeom>
+            <a:avLst/>
+            <a:gdLst>
+              <a:gd name="connsiteX0" fmla="*/ 0 w 3048000"/>
+              <a:gd name="connsiteY0" fmla="*/ 203200 h 203200"/>
+              <a:gd name="connsiteX1" fmla="*/ 221673 w 3048000"/>
+              <a:gd name="connsiteY1" fmla="*/ 0 h 203200"/>
+              <a:gd name="connsiteX2" fmla="*/ 3048000 w 3048000"/>
+              <a:gd name="connsiteY2" fmla="*/ 0 h 203200"/>
+            </a:gdLst>
+            <a:ahLst/>
+            <a:cxnLst>
+              <a:cxn ang="0">
+                <a:pos x="connsiteX0" y="connsiteY0"/>
+              </a:cxn>
+              <a:cxn ang="0">
+                <a:pos x="connsiteX1" y="connsiteY1"/>
+              </a:cxn>
+              <a:cxn ang="0">
+                <a:pos x="connsiteX2" y="connsiteY2"/>
+              </a:cxn>
+            </a:cxnLst>
+            <a:rect l="l" t="t" r="r" b="b"/>
+            <a:pathLst>
+              <a:path w="3048000" h="203200">
+                <a:moveTo>
+                  <a:pt x="0" y="203200"/>
+                </a:moveTo>
+                <a:lnTo>
+                  <a:pt x="221673" y="0"/>
+                </a:lnTo>
+                <a:lnTo>
+                  <a:pt x="3048000" y="0"/>
+                </a:lnTo>
+              </a:path>
+            </a:pathLst>
+          </a:custGeom>
+          <a:noFill/>
+          <a:ln w="19050">
+            <a:solidFill>
+              <a:schemeClr val="accent3"/>
+            </a:solidFill>
+            <a:prstDash val="sysDot"/>
+            <a:headEnd type="none" w="med" len="med"/>
+            <a:tailEnd type="arrow" w="med" len="med"/>
+          </a:ln>
+          <a:effectLst/>
+        </p:spPr>
+        <p:style>
+          <a:lnRef idx="1">
+            <a:schemeClr val="accent2"/>
+          </a:lnRef>
+          <a:fillRef idx="2">
+            <a:schemeClr val="accent2"/>
+          </a:fillRef>
+          <a:effectRef idx="1">
+            <a:schemeClr val="accent2"/>
+          </a:effectRef>
+          <a:fontRef idx="minor">
+            <a:schemeClr val="dk1"/>
+          </a:fontRef>
+        </p:style>
+        <p:txBody>
+          <a:bodyPr rtlCol="0" anchor="ctr"/>
+          <a:lstStyle/>
+          <a:p>
+            <a:pPr algn="ctr"/>
+            <a:endParaRPr lang="en-SG"/>
+          </a:p>
+        </p:txBody>
+      </p:sp>
+      <p:cxnSp>
+        <p:nvCxnSpPr>
+          <p:cNvPr id="55" name="Elbow Connector 63"/>
+          <p:cNvCxnSpPr/>
+          <p:nvPr/>
+        </p:nvCxnSpPr>
+        <p:spPr>
+          <a:xfrm rot="10800000">
+            <a:off x="5063160" y="4636178"/>
+            <a:ext cx="464338" cy="34"/>
+          </a:xfrm>
+          <a:prstGeom prst="bentConnector3">
+            <a:avLst>
+              <a:gd name="adj1" fmla="val 50000"/>
+            </a:avLst>
+          </a:prstGeom>
+          <a:ln w="6350">
+            <a:solidFill>
+              <a:schemeClr val="accent3"/>
+            </a:solidFill>
+            <a:headEnd type="none" w="med" len="med"/>
+            <a:tailEnd type="none" w="med" len="med"/>
+          </a:ln>
+          <a:effectLst/>
+        </p:spPr>
+        <p:style>
+          <a:lnRef idx="1">
+            <a:schemeClr val="accent2"/>
+          </a:lnRef>
+          <a:fillRef idx="2">
+            <a:schemeClr val="accent2"/>
+          </a:fillRef>
+          <a:effectRef idx="1">
+            <a:schemeClr val="accent2"/>
+          </a:effectRef>
+          <a:fontRef idx="minor">
+            <a:schemeClr val="dk1"/>
+          </a:fontRef>
+        </p:style>
+      </p:cxnSp>
+      <p:cxnSp>
+        <p:nvCxnSpPr>
+          <p:cNvPr id="56" name="Elbow Connector 63"/>
+          <p:cNvCxnSpPr/>
+          <p:nvPr/>
+        </p:nvCxnSpPr>
+        <p:spPr>
+          <a:xfrm rot="10800000">
+            <a:off x="5070574" y="4871979"/>
+            <a:ext cx="464338" cy="34"/>
+          </a:xfrm>
+          <a:prstGeom prst="bentConnector3">
+            <a:avLst>
+              <a:gd name="adj1" fmla="val 50000"/>
+            </a:avLst>
+          </a:prstGeom>
+          <a:ln w="6350">
+            <a:solidFill>
+              <a:schemeClr val="accent3"/>
+            </a:solidFill>
+            <a:headEnd type="none" w="med" len="med"/>
+            <a:tailEnd type="none" w="med" len="med"/>
           </a:ln>
           <a:effectLst/>
         </p:spPr>
@@ -16927,6 +16998,1847 @@
           <a:chExt cx="0" cy="0"/>
         </a:xfrm>
       </p:grpSpPr>
+      <p:sp>
+        <p:nvSpPr>
+          <p:cNvPr id="7" name="Rectangle 62"/>
+          <p:cNvSpPr/>
+          <p:nvPr/>
+        </p:nvSpPr>
+        <p:spPr>
+          <a:xfrm>
+            <a:off x="3752582" y="4289371"/>
+            <a:ext cx="1371600" cy="346760"/>
+          </a:xfrm>
+          <a:prstGeom prst="rect">
+            <a:avLst/>
+          </a:prstGeom>
+          <a:solidFill>
+            <a:schemeClr val="accent5">
+              <a:lumMod val="75000"/>
+            </a:schemeClr>
+          </a:solidFill>
+          <a:ln w="19050">
+            <a:solidFill>
+              <a:schemeClr val="accent5">
+                <a:lumMod val="75000"/>
+              </a:schemeClr>
+            </a:solidFill>
+          </a:ln>
+          <a:effectLst/>
+        </p:spPr>
+        <p:style>
+          <a:lnRef idx="1">
+            <a:schemeClr val="accent2"/>
+          </a:lnRef>
+          <a:fillRef idx="2">
+            <a:schemeClr val="accent2"/>
+          </a:fillRef>
+          <a:effectRef idx="1">
+            <a:schemeClr val="accent2"/>
+          </a:effectRef>
+          <a:fontRef idx="minor">
+            <a:schemeClr val="dk1"/>
+          </a:fontRef>
+        </p:style>
+        <p:txBody>
+          <a:bodyPr rtlCol="0" anchor="ctr"/>
+          <a:lstStyle/>
+          <a:p>
+            <a:pPr algn="ctr"/>
+            <a:r>
+              <a:rPr lang="en-US" sz="1600" dirty="0" smtClean="0">
+                <a:solidFill>
+                  <a:schemeClr val="bg1"/>
+                </a:solidFill>
+              </a:rPr>
+              <a:t>:</a:t>
+            </a:r>
+            <a:r>
+              <a:rPr lang="en-US" sz="1600" dirty="0" err="1" smtClean="0">
+                <a:solidFill>
+                  <a:schemeClr val="bg1"/>
+                </a:solidFill>
+              </a:rPr>
+              <a:t>EventsCenter</a:t>
+            </a:r>
+            <a:endParaRPr lang="en-SG" sz="1600" dirty="0">
+              <a:solidFill>
+                <a:schemeClr val="bg1"/>
+              </a:solidFill>
+            </a:endParaRPr>
+          </a:p>
+        </p:txBody>
+      </p:sp>
+      <p:cxnSp>
+        <p:nvCxnSpPr>
+          <p:cNvPr id="8" name="Straight Connector 7"/>
+          <p:cNvCxnSpPr/>
+          <p:nvPr/>
+        </p:nvCxnSpPr>
+        <p:spPr>
+          <a:xfrm>
+            <a:off x="4438382" y="4622026"/>
+            <a:ext cx="0" cy="1723059"/>
+          </a:xfrm>
+          <a:prstGeom prst="line">
+            <a:avLst/>
+          </a:prstGeom>
+          <a:ln w="19050">
+            <a:solidFill>
+              <a:schemeClr val="accent5">
+                <a:lumMod val="75000"/>
+              </a:schemeClr>
+            </a:solidFill>
+            <a:prstDash val="sysDash"/>
+          </a:ln>
+          <a:effectLst/>
+        </p:spPr>
+        <p:style>
+          <a:lnRef idx="1">
+            <a:schemeClr val="accent1"/>
+          </a:lnRef>
+          <a:fillRef idx="2">
+            <a:schemeClr val="accent1"/>
+          </a:fillRef>
+          <a:effectRef idx="1">
+            <a:schemeClr val="accent1"/>
+          </a:effectRef>
+          <a:fontRef idx="minor">
+            <a:schemeClr val="dk1"/>
+          </a:fontRef>
+        </p:style>
+      </p:cxnSp>
+      <p:sp>
+        <p:nvSpPr>
+          <p:cNvPr id="9" name="Rectangle 8"/>
+          <p:cNvSpPr/>
+          <p:nvPr/>
+        </p:nvSpPr>
+        <p:spPr>
+          <a:xfrm>
+            <a:off x="4367379" y="4965178"/>
+            <a:ext cx="142006" cy="1036757"/>
+          </a:xfrm>
+          <a:prstGeom prst="rect">
+            <a:avLst/>
+          </a:prstGeom>
+          <a:solidFill>
+            <a:schemeClr val="accent5">
+              <a:lumMod val="75000"/>
+            </a:schemeClr>
+          </a:solidFill>
+          <a:ln>
+            <a:solidFill>
+              <a:schemeClr val="accent5">
+                <a:lumMod val="75000"/>
+              </a:schemeClr>
+            </a:solidFill>
+          </a:ln>
+          <a:effectLst/>
+        </p:spPr>
+        <p:style>
+          <a:lnRef idx="1">
+            <a:schemeClr val="accent3"/>
+          </a:lnRef>
+          <a:fillRef idx="2">
+            <a:schemeClr val="accent3"/>
+          </a:fillRef>
+          <a:effectRef idx="1">
+            <a:schemeClr val="accent3"/>
+          </a:effectRef>
+          <a:fontRef idx="minor">
+            <a:schemeClr val="dk1"/>
+          </a:fontRef>
+        </p:style>
+        <p:txBody>
+          <a:bodyPr rtlCol="0" anchor="ctr"/>
+          <a:lstStyle/>
+          <a:p>
+            <a:pPr algn="ctr"/>
+            <a:endParaRPr lang="en-SG" sz="1400">
+              <a:solidFill>
+                <a:schemeClr val="dk1"/>
+              </a:solidFill>
+            </a:endParaRPr>
+          </a:p>
+        </p:txBody>
+      </p:sp>
+      <p:sp>
+        <p:nvSpPr>
+          <p:cNvPr id="14" name="Rectangle 62"/>
+          <p:cNvSpPr/>
+          <p:nvPr/>
+        </p:nvSpPr>
+        <p:spPr>
+          <a:xfrm>
+            <a:off x="782210" y="775390"/>
+            <a:ext cx="1093635" cy="346760"/>
+          </a:xfrm>
+          <a:prstGeom prst="rect">
+            <a:avLst/>
+          </a:prstGeom>
+          <a:solidFill>
+            <a:srgbClr val="00B14F"/>
+          </a:solidFill>
+          <a:ln w="19050">
+            <a:solidFill>
+              <a:srgbClr val="00B050"/>
+            </a:solidFill>
+          </a:ln>
+          <a:effectLst/>
+        </p:spPr>
+        <p:style>
+          <a:lnRef idx="1">
+            <a:schemeClr val="accent2"/>
+          </a:lnRef>
+          <a:fillRef idx="2">
+            <a:schemeClr val="accent2"/>
+          </a:fillRef>
+          <a:effectRef idx="1">
+            <a:schemeClr val="accent2"/>
+          </a:effectRef>
+          <a:fontRef idx="minor">
+            <a:schemeClr val="dk1"/>
+          </a:fontRef>
+        </p:style>
+        <p:txBody>
+          <a:bodyPr rtlCol="0" anchor="ctr"/>
+          <a:lstStyle/>
+          <a:p>
+            <a:pPr algn="ctr"/>
+            <a:r>
+              <a:rPr lang="en-US" sz="1600" dirty="0" smtClean="0">
+                <a:solidFill>
+                  <a:schemeClr val="bg1"/>
+                </a:solidFill>
+              </a:rPr>
+              <a:t>:UI</a:t>
+            </a:r>
+            <a:endParaRPr lang="en-SG" sz="1600" dirty="0">
+              <a:solidFill>
+                <a:schemeClr val="bg1"/>
+              </a:solidFill>
+            </a:endParaRPr>
+          </a:p>
+        </p:txBody>
+      </p:sp>
+      <p:cxnSp>
+        <p:nvCxnSpPr>
+          <p:cNvPr id="15" name="Straight Connector 14"/>
+          <p:cNvCxnSpPr/>
+          <p:nvPr/>
+        </p:nvCxnSpPr>
+        <p:spPr>
+          <a:xfrm flipH="1">
+            <a:off x="1306059" y="1139061"/>
+            <a:ext cx="22968" cy="4865717"/>
+          </a:xfrm>
+          <a:prstGeom prst="line">
+            <a:avLst/>
+          </a:prstGeom>
+          <a:ln w="19050">
+            <a:solidFill>
+              <a:srgbClr val="00B050"/>
+            </a:solidFill>
+            <a:prstDash val="sysDash"/>
+          </a:ln>
+          <a:effectLst/>
+        </p:spPr>
+        <p:style>
+          <a:lnRef idx="1">
+            <a:schemeClr val="accent1"/>
+          </a:lnRef>
+          <a:fillRef idx="2">
+            <a:schemeClr val="accent1"/>
+          </a:fillRef>
+          <a:effectRef idx="1">
+            <a:schemeClr val="accent1"/>
+          </a:effectRef>
+          <a:fontRef idx="minor">
+            <a:schemeClr val="dk1"/>
+          </a:fontRef>
+        </p:style>
+      </p:cxnSp>
+      <p:sp>
+        <p:nvSpPr>
+          <p:cNvPr id="16" name="Rectangle 15"/>
+          <p:cNvSpPr/>
+          <p:nvPr/>
+        </p:nvSpPr>
+        <p:spPr>
+          <a:xfrm>
+            <a:off x="1242123" y="5081330"/>
+            <a:ext cx="130545" cy="273127"/>
+          </a:xfrm>
+          <a:prstGeom prst="rect">
+            <a:avLst/>
+          </a:prstGeom>
+          <a:solidFill>
+            <a:srgbClr val="00B050"/>
+          </a:solidFill>
+          <a:ln>
+            <a:solidFill>
+              <a:srgbClr val="00B050"/>
+            </a:solidFill>
+          </a:ln>
+          <a:effectLst/>
+        </p:spPr>
+        <p:style>
+          <a:lnRef idx="1">
+            <a:schemeClr val="accent3"/>
+          </a:lnRef>
+          <a:fillRef idx="2">
+            <a:schemeClr val="accent3"/>
+          </a:fillRef>
+          <a:effectRef idx="1">
+            <a:schemeClr val="accent3"/>
+          </a:effectRef>
+          <a:fontRef idx="minor">
+            <a:schemeClr val="dk1"/>
+          </a:fontRef>
+        </p:style>
+        <p:txBody>
+          <a:bodyPr rtlCol="0" anchor="ctr"/>
+          <a:lstStyle/>
+          <a:p>
+            <a:pPr algn="ctr"/>
+            <a:endParaRPr lang="en-SG" sz="1400">
+              <a:solidFill>
+                <a:schemeClr val="dk1"/>
+              </a:solidFill>
+            </a:endParaRPr>
+          </a:p>
+        </p:txBody>
+      </p:sp>
+      <p:cxnSp>
+        <p:nvCxnSpPr>
+          <p:cNvPr id="17" name="Straight Arrow Connector 16"/>
+          <p:cNvCxnSpPr/>
+          <p:nvPr/>
+        </p:nvCxnSpPr>
+        <p:spPr>
+          <a:xfrm flipH="1">
+            <a:off x="1582451" y="5532924"/>
+            <a:ext cx="2713629" cy="0"/>
+          </a:xfrm>
+          <a:prstGeom prst="straightConnector1">
+            <a:avLst/>
+          </a:prstGeom>
+          <a:ln w="19050">
+            <a:solidFill>
+              <a:srgbClr val="00B050"/>
+            </a:solidFill>
+            <a:prstDash val="sysDash"/>
+            <a:headEnd type="arrow" w="med" len="med"/>
+            <a:tailEnd type="none" w="med" len="med"/>
+          </a:ln>
+        </p:spPr>
+        <p:style>
+          <a:lnRef idx="1">
+            <a:schemeClr val="accent1"/>
+          </a:lnRef>
+          <a:fillRef idx="0">
+            <a:schemeClr val="accent1"/>
+          </a:fillRef>
+          <a:effectRef idx="0">
+            <a:schemeClr val="accent1"/>
+          </a:effectRef>
+          <a:fontRef idx="minor">
+            <a:schemeClr val="tx1"/>
+          </a:fontRef>
+        </p:style>
+      </p:cxnSp>
+      <p:cxnSp>
+        <p:nvCxnSpPr>
+          <p:cNvPr id="18" name="Straight Arrow Connector 17"/>
+          <p:cNvCxnSpPr/>
+          <p:nvPr/>
+        </p:nvCxnSpPr>
+        <p:spPr>
+          <a:xfrm>
+            <a:off x="1600200" y="5181600"/>
+            <a:ext cx="2724463" cy="0"/>
+          </a:xfrm>
+          <a:prstGeom prst="straightConnector1">
+            <a:avLst/>
+          </a:prstGeom>
+          <a:ln w="19050">
+            <a:solidFill>
+              <a:schemeClr val="accent5">
+                <a:lumMod val="75000"/>
+              </a:schemeClr>
+            </a:solidFill>
+            <a:headEnd type="arrow" w="med" len="med"/>
+            <a:tailEnd type="none" w="med" len="med"/>
+          </a:ln>
+        </p:spPr>
+        <p:style>
+          <a:lnRef idx="1">
+            <a:schemeClr val="accent1"/>
+          </a:lnRef>
+          <a:fillRef idx="0">
+            <a:schemeClr val="accent1"/>
+          </a:fillRef>
+          <a:effectRef idx="0">
+            <a:schemeClr val="accent1"/>
+          </a:effectRef>
+          <a:fontRef idx="minor">
+            <a:schemeClr val="tx1"/>
+          </a:fontRef>
+        </p:style>
+      </p:cxnSp>
+      <p:sp>
+        <p:nvSpPr>
+          <p:cNvPr id="19" name="TextBox 18"/>
+          <p:cNvSpPr txBox="1"/>
+          <p:nvPr/>
+        </p:nvSpPr>
+        <p:spPr>
+          <a:xfrm>
+            <a:off x="1752459" y="4904455"/>
+            <a:ext cx="3090607" cy="215444"/>
+          </a:xfrm>
+          <a:prstGeom prst="rect">
+            <a:avLst/>
+          </a:prstGeom>
+          <a:noFill/>
+        </p:spPr>
+        <p:txBody>
+          <a:bodyPr wrap="square" lIns="0" tIns="0" rIns="0" bIns="0" rtlCol="0">
+            <a:spAutoFit/>
+          </a:bodyPr>
+          <a:lstStyle/>
+          <a:p>
+            <a:r>
+              <a:rPr lang="en-US" sz="1400" dirty="0" err="1">
+                <a:solidFill>
+                  <a:srgbClr val="00B14F"/>
+                </a:solidFill>
+              </a:rPr>
+              <a:t>handleModifyStorageEvent</a:t>
+            </a:r>
+            <a:r>
+              <a:rPr lang="en-US" sz="1400" dirty="0" smtClean="0">
+                <a:solidFill>
+                  <a:srgbClr val="00B050"/>
+                </a:solidFill>
+              </a:rPr>
+              <a:t>()</a:t>
+            </a:r>
+            <a:endParaRPr lang="en-US" sz="1400" dirty="0">
+              <a:solidFill>
+                <a:srgbClr val="00B050"/>
+              </a:solidFill>
+            </a:endParaRPr>
+          </a:p>
+        </p:txBody>
+      </p:sp>
+      <p:grpSp>
+        <p:nvGrpSpPr>
+          <p:cNvPr id="20" name="Group 19"/>
+          <p:cNvGrpSpPr/>
+          <p:nvPr/>
+        </p:nvGrpSpPr>
+        <p:grpSpPr>
+          <a:xfrm>
+            <a:off x="1073814" y="5022890"/>
+            <a:ext cx="217349" cy="270072"/>
+            <a:chOff x="1028134" y="5612032"/>
+            <a:chExt cx="217349" cy="270072"/>
+          </a:xfrm>
+        </p:grpSpPr>
+        <p:sp>
+          <p:nvSpPr>
+            <p:cNvPr id="21" name="Freeform 20"/>
+            <p:cNvSpPr/>
+            <p:nvPr/>
+          </p:nvSpPr>
+          <p:spPr>
+            <a:xfrm rot="2600998" flipH="1" flipV="1">
+              <a:off x="1028134" y="5612032"/>
+              <a:ext cx="167452" cy="116880"/>
+            </a:xfrm>
+            <a:custGeom>
+              <a:avLst/>
+              <a:gdLst>
+                <a:gd name="connsiteX0" fmla="*/ 0 w 226400"/>
+                <a:gd name="connsiteY0" fmla="*/ 32920 h 171466"/>
+                <a:gd name="connsiteX1" fmla="*/ 157018 w 226400"/>
+                <a:gd name="connsiteY1" fmla="*/ 5211 h 171466"/>
+                <a:gd name="connsiteX2" fmla="*/ 221673 w 226400"/>
+                <a:gd name="connsiteY2" fmla="*/ 125284 h 171466"/>
+                <a:gd name="connsiteX3" fmla="*/ 36945 w 226400"/>
+                <a:gd name="connsiteY3" fmla="*/ 171466 h 171466"/>
+              </a:gdLst>
+              <a:ahLst/>
+              <a:cxnLst>
+                <a:cxn ang="0">
+                  <a:pos x="connsiteX0" y="connsiteY0"/>
+                </a:cxn>
+                <a:cxn ang="0">
+                  <a:pos x="connsiteX1" y="connsiteY1"/>
+                </a:cxn>
+                <a:cxn ang="0">
+                  <a:pos x="connsiteX2" y="connsiteY2"/>
+                </a:cxn>
+                <a:cxn ang="0">
+                  <a:pos x="connsiteX3" y="connsiteY3"/>
+                </a:cxn>
+              </a:cxnLst>
+              <a:rect l="l" t="t" r="r" b="b"/>
+              <a:pathLst>
+                <a:path w="226400" h="171466">
+                  <a:moveTo>
+                    <a:pt x="0" y="32920"/>
+                  </a:moveTo>
+                  <a:cubicBezTo>
+                    <a:pt x="60036" y="11368"/>
+                    <a:pt x="120073" y="-10183"/>
+                    <a:pt x="157018" y="5211"/>
+                  </a:cubicBezTo>
+                  <a:cubicBezTo>
+                    <a:pt x="193963" y="20605"/>
+                    <a:pt x="241685" y="97575"/>
+                    <a:pt x="221673" y="125284"/>
+                  </a:cubicBezTo>
+                  <a:cubicBezTo>
+                    <a:pt x="201661" y="152993"/>
+                    <a:pt x="119303" y="162229"/>
+                    <a:pt x="36945" y="171466"/>
+                  </a:cubicBezTo>
+                </a:path>
+              </a:pathLst>
+            </a:custGeom>
+            <a:ln w="19050">
+              <a:solidFill>
+                <a:srgbClr val="00B050"/>
+              </a:solidFill>
+              <a:headEnd type="arrow" w="med" len="med"/>
+              <a:tailEnd type="none" w="med" len="med"/>
+            </a:ln>
+          </p:spPr>
+          <p:style>
+            <a:lnRef idx="1">
+              <a:schemeClr val="accent1"/>
+            </a:lnRef>
+            <a:fillRef idx="0">
+              <a:schemeClr val="accent1"/>
+            </a:fillRef>
+            <a:effectRef idx="0">
+              <a:schemeClr val="accent1"/>
+            </a:effectRef>
+            <a:fontRef idx="minor">
+              <a:schemeClr val="tx1"/>
+            </a:fontRef>
+          </p:style>
+          <p:txBody>
+            <a:bodyPr rtlCol="0" anchor="ctr"/>
+            <a:lstStyle/>
+            <a:p>
+              <a:pPr algn="ctr"/>
+              <a:endParaRPr lang="en-SG"/>
+            </a:p>
+          </p:txBody>
+        </p:sp>
+        <p:sp>
+          <p:nvSpPr>
+            <p:cNvPr id="22" name="Rectangle 21"/>
+            <p:cNvSpPr/>
+            <p:nvPr/>
+          </p:nvSpPr>
+          <p:spPr>
+            <a:xfrm>
+              <a:off x="1147403" y="5712513"/>
+              <a:ext cx="98080" cy="169591"/>
+            </a:xfrm>
+            <a:prstGeom prst="rect">
+              <a:avLst/>
+            </a:prstGeom>
+            <a:solidFill>
+              <a:srgbClr val="00B050"/>
+            </a:solidFill>
+            <a:ln>
+              <a:solidFill>
+                <a:schemeClr val="bg1"/>
+              </a:solidFill>
+            </a:ln>
+            <a:effectLst/>
+          </p:spPr>
+          <p:style>
+            <a:lnRef idx="1">
+              <a:schemeClr val="accent3"/>
+            </a:lnRef>
+            <a:fillRef idx="2">
+              <a:schemeClr val="accent3"/>
+            </a:fillRef>
+            <a:effectRef idx="1">
+              <a:schemeClr val="accent3"/>
+            </a:effectRef>
+            <a:fontRef idx="minor">
+              <a:schemeClr val="dk1"/>
+            </a:fontRef>
+          </p:style>
+          <p:txBody>
+            <a:bodyPr rtlCol="0" anchor="ctr"/>
+            <a:lstStyle/>
+            <a:p>
+              <a:pPr algn="ctr"/>
+              <a:endParaRPr lang="en-SG" sz="1400">
+                <a:solidFill>
+                  <a:schemeClr val="dk1"/>
+                </a:solidFill>
+              </a:endParaRPr>
+            </a:p>
+          </p:txBody>
+        </p:sp>
+      </p:grpSp>
+      <p:sp>
+        <p:nvSpPr>
+          <p:cNvPr id="27" name="Rectangle 62"/>
+          <p:cNvSpPr/>
+          <p:nvPr/>
+        </p:nvSpPr>
+        <p:spPr>
+          <a:xfrm>
+            <a:off x="3036217" y="762000"/>
+            <a:ext cx="1455629" cy="346760"/>
+          </a:xfrm>
+          <a:prstGeom prst="rect">
+            <a:avLst/>
+          </a:prstGeom>
+          <a:solidFill>
+            <a:srgbClr val="0070C0"/>
+          </a:solidFill>
+          <a:ln w="19050">
+            <a:solidFill>
+              <a:srgbClr val="0070C0"/>
+            </a:solidFill>
+          </a:ln>
+          <a:effectLst/>
+        </p:spPr>
+        <p:style>
+          <a:lnRef idx="1">
+            <a:schemeClr val="accent2"/>
+          </a:lnRef>
+          <a:fillRef idx="2">
+            <a:schemeClr val="accent2"/>
+          </a:fillRef>
+          <a:effectRef idx="1">
+            <a:schemeClr val="accent2"/>
+          </a:effectRef>
+          <a:fontRef idx="minor">
+            <a:schemeClr val="dk1"/>
+          </a:fontRef>
+        </p:style>
+        <p:txBody>
+          <a:bodyPr rtlCol="0" anchor="ctr"/>
+          <a:lstStyle/>
+          <a:p>
+            <a:pPr algn="ctr"/>
+            <a:r>
+              <a:rPr lang="en-US" sz="1600" dirty="0">
+                <a:solidFill>
+                  <a:schemeClr val="bg1"/>
+                </a:solidFill>
+              </a:rPr>
+              <a:t>:</a:t>
+            </a:r>
+            <a:r>
+              <a:rPr lang="en-US" sz="1600" dirty="0" err="1">
+                <a:solidFill>
+                  <a:schemeClr val="bg1"/>
+                </a:solidFill>
+              </a:rPr>
+              <a:t>LogicManager</a:t>
+            </a:r>
+            <a:endParaRPr lang="en-SG" sz="1600" dirty="0">
+              <a:solidFill>
+                <a:schemeClr val="bg1"/>
+              </a:solidFill>
+            </a:endParaRPr>
+          </a:p>
+        </p:txBody>
+      </p:sp>
+      <p:cxnSp>
+        <p:nvCxnSpPr>
+          <p:cNvPr id="30" name="Straight Connector 29"/>
+          <p:cNvCxnSpPr/>
+          <p:nvPr/>
+        </p:nvCxnSpPr>
+        <p:spPr>
+          <a:xfrm>
+            <a:off x="3677810" y="1141876"/>
+            <a:ext cx="8704" cy="3034006"/>
+          </a:xfrm>
+          <a:prstGeom prst="line">
+            <a:avLst/>
+          </a:prstGeom>
+          <a:ln w="19050">
+            <a:solidFill>
+              <a:srgbClr val="0070C0"/>
+            </a:solidFill>
+            <a:prstDash val="sysDash"/>
+          </a:ln>
+          <a:effectLst/>
+        </p:spPr>
+        <p:style>
+          <a:lnRef idx="1">
+            <a:schemeClr val="accent1"/>
+          </a:lnRef>
+          <a:fillRef idx="2">
+            <a:schemeClr val="accent1"/>
+          </a:fillRef>
+          <a:effectRef idx="1">
+            <a:schemeClr val="accent1"/>
+          </a:effectRef>
+          <a:fontRef idx="minor">
+            <a:schemeClr val="dk1"/>
+          </a:fontRef>
+        </p:style>
+      </p:cxnSp>
+      <p:sp>
+        <p:nvSpPr>
+          <p:cNvPr id="34" name="Rectangle 33"/>
+          <p:cNvSpPr/>
+          <p:nvPr/>
+        </p:nvSpPr>
+        <p:spPr>
+          <a:xfrm>
+            <a:off x="3613766" y="1703961"/>
+            <a:ext cx="150266" cy="2218815"/>
+          </a:xfrm>
+          <a:prstGeom prst="rect">
+            <a:avLst/>
+          </a:prstGeom>
+          <a:solidFill>
+            <a:srgbClr val="0070C0"/>
+          </a:solidFill>
+          <a:ln>
+            <a:solidFill>
+              <a:schemeClr val="accent5">
+                <a:lumMod val="75000"/>
+              </a:schemeClr>
+            </a:solidFill>
+          </a:ln>
+          <a:effectLst/>
+        </p:spPr>
+        <p:style>
+          <a:lnRef idx="1">
+            <a:schemeClr val="accent3"/>
+          </a:lnRef>
+          <a:fillRef idx="2">
+            <a:schemeClr val="accent3"/>
+          </a:fillRef>
+          <a:effectRef idx="1">
+            <a:schemeClr val="accent3"/>
+          </a:effectRef>
+          <a:fontRef idx="minor">
+            <a:schemeClr val="dk1"/>
+          </a:fontRef>
+        </p:style>
+        <p:txBody>
+          <a:bodyPr rtlCol="0" anchor="ctr"/>
+          <a:lstStyle/>
+          <a:p>
+            <a:pPr algn="ctr"/>
+            <a:endParaRPr lang="en-SG" sz="1400">
+              <a:solidFill>
+                <a:schemeClr val="dk1"/>
+              </a:solidFill>
+            </a:endParaRPr>
+          </a:p>
+        </p:txBody>
+      </p:sp>
+      <p:sp>
+        <p:nvSpPr>
+          <p:cNvPr id="35" name="TextBox 34"/>
+          <p:cNvSpPr txBox="1"/>
+          <p:nvPr/>
+        </p:nvSpPr>
+        <p:spPr>
+          <a:xfrm>
+            <a:off x="1902494" y="1229305"/>
+            <a:ext cx="2694116" cy="430887"/>
+          </a:xfrm>
+          <a:prstGeom prst="rect">
+            <a:avLst/>
+          </a:prstGeom>
+          <a:noFill/>
+        </p:spPr>
+        <p:txBody>
+          <a:bodyPr wrap="square" lIns="0" tIns="0" rIns="0" bIns="0" rtlCol="0">
+            <a:spAutoFit/>
+          </a:bodyPr>
+          <a:lstStyle/>
+          <a:p>
+            <a:r>
+              <a:rPr lang="en-US" sz="1400" dirty="0" smtClean="0">
+                <a:solidFill>
+                  <a:srgbClr val="0070C0"/>
+                </a:solidFill>
+              </a:rPr>
+              <a:t>execute</a:t>
+            </a:r>
+            <a:r>
+              <a:rPr lang="en-US" sz="1400" dirty="0" smtClean="0">
+                <a:solidFill>
+                  <a:srgbClr val="0070C0"/>
+                </a:solidFill>
+              </a:rPr>
+              <a:t>(“modify storage/</a:t>
+            </a:r>
+            <a:r>
+              <a:rPr lang="en-US" sz="1400" dirty="0" err="1" smtClean="0">
+                <a:solidFill>
+                  <a:srgbClr val="0070C0"/>
+                </a:solidFill>
+              </a:rPr>
+              <a:t>sample.xml</a:t>
+            </a:r>
+            <a:r>
+              <a:rPr lang="en-US" sz="1400" dirty="0" smtClean="0">
+                <a:solidFill>
+                  <a:srgbClr val="0070C0"/>
+                </a:solidFill>
+              </a:rPr>
+              <a:t>”)</a:t>
+            </a:r>
+            <a:endParaRPr lang="en-US" sz="1400" dirty="0">
+              <a:solidFill>
+                <a:srgbClr val="0070C0"/>
+              </a:solidFill>
+            </a:endParaRPr>
+          </a:p>
+        </p:txBody>
+      </p:sp>
+      <p:cxnSp>
+        <p:nvCxnSpPr>
+          <p:cNvPr id="36" name="Straight Arrow Connector 35"/>
+          <p:cNvCxnSpPr/>
+          <p:nvPr/>
+        </p:nvCxnSpPr>
+        <p:spPr>
+          <a:xfrm>
+            <a:off x="1772810" y="1729853"/>
+            <a:ext cx="1758647" cy="0"/>
+          </a:xfrm>
+          <a:prstGeom prst="straightConnector1">
+            <a:avLst/>
+          </a:prstGeom>
+          <a:ln w="19050">
+            <a:solidFill>
+              <a:srgbClr val="00B050"/>
+            </a:solidFill>
+            <a:tailEnd type="arrow"/>
+          </a:ln>
+        </p:spPr>
+        <p:style>
+          <a:lnRef idx="1">
+            <a:schemeClr val="accent1"/>
+          </a:lnRef>
+          <a:fillRef idx="0">
+            <a:schemeClr val="accent1"/>
+          </a:fillRef>
+          <a:effectRef idx="0">
+            <a:schemeClr val="accent1"/>
+          </a:effectRef>
+          <a:fontRef idx="minor">
+            <a:schemeClr val="tx1"/>
+          </a:fontRef>
+        </p:style>
+      </p:cxnSp>
+      <p:sp>
+        <p:nvSpPr>
+          <p:cNvPr id="39" name="Rectangle 62"/>
+          <p:cNvSpPr/>
+          <p:nvPr/>
+        </p:nvSpPr>
+        <p:spPr>
+          <a:xfrm>
+            <a:off x="5105400" y="762000"/>
+            <a:ext cx="1093635" cy="346760"/>
+          </a:xfrm>
+          <a:prstGeom prst="rect">
+            <a:avLst/>
+          </a:prstGeom>
+          <a:solidFill>
+            <a:srgbClr val="0070C0"/>
+          </a:solidFill>
+          <a:ln w="19050">
+            <a:solidFill>
+              <a:srgbClr val="0070C0"/>
+            </a:solidFill>
+          </a:ln>
+          <a:effectLst/>
+        </p:spPr>
+        <p:style>
+          <a:lnRef idx="1">
+            <a:schemeClr val="accent2"/>
+          </a:lnRef>
+          <a:fillRef idx="2">
+            <a:schemeClr val="accent2"/>
+          </a:fillRef>
+          <a:effectRef idx="1">
+            <a:schemeClr val="accent2"/>
+          </a:effectRef>
+          <a:fontRef idx="minor">
+            <a:schemeClr val="dk1"/>
+          </a:fontRef>
+        </p:style>
+        <p:txBody>
+          <a:bodyPr rtlCol="0" anchor="ctr"/>
+          <a:lstStyle/>
+          <a:p>
+            <a:pPr algn="ctr"/>
+            <a:r>
+              <a:rPr lang="en-US" sz="1600" dirty="0" smtClean="0">
+                <a:solidFill>
+                  <a:schemeClr val="bg1"/>
+                </a:solidFill>
+              </a:rPr>
+              <a:t>:Parser</a:t>
+            </a:r>
+            <a:endParaRPr lang="en-SG" sz="1600" dirty="0">
+              <a:solidFill>
+                <a:schemeClr val="bg1"/>
+              </a:solidFill>
+            </a:endParaRPr>
+          </a:p>
+        </p:txBody>
+      </p:sp>
+      <p:sp>
+        <p:nvSpPr>
+          <p:cNvPr id="40" name="TextBox 39"/>
+          <p:cNvSpPr txBox="1"/>
+          <p:nvPr/>
+        </p:nvSpPr>
+        <p:spPr>
+          <a:xfrm>
+            <a:off x="3937568" y="1295426"/>
+            <a:ext cx="1676982" cy="430887"/>
+          </a:xfrm>
+          <a:prstGeom prst="rect">
+            <a:avLst/>
+          </a:prstGeom>
+          <a:noFill/>
+        </p:spPr>
+        <p:txBody>
+          <a:bodyPr wrap="square" lIns="0" tIns="0" rIns="0" bIns="0" rtlCol="0">
+            <a:spAutoFit/>
+          </a:bodyPr>
+          <a:lstStyle>
+            <a:defPPr>
+              <a:defRPr lang="en-US"/>
+            </a:defPPr>
+            <a:lvl1pPr algn="r">
+              <a:defRPr sz="1400">
+                <a:solidFill>
+                  <a:srgbClr val="0070C0"/>
+                </a:solidFill>
+              </a:defRPr>
+            </a:lvl1pPr>
+          </a:lstStyle>
+          <a:p>
+            <a:pPr algn="l"/>
+            <a:r>
+              <a:rPr lang="en-US" dirty="0" smtClean="0"/>
+              <a:t>parse</a:t>
+            </a:r>
+            <a:r>
+              <a:rPr lang="en-US" dirty="0" smtClean="0"/>
+              <a:t>(“</a:t>
+            </a:r>
+            <a:r>
+              <a:rPr lang="en-US" dirty="0"/>
+              <a:t>modify </a:t>
+            </a:r>
+            <a:r>
+              <a:rPr lang="en-US" dirty="0" smtClean="0"/>
+              <a:t>storage/</a:t>
+            </a:r>
+            <a:r>
+              <a:rPr lang="en-US" dirty="0" err="1" smtClean="0"/>
+              <a:t>sample.xml</a:t>
+            </a:r>
+            <a:r>
+              <a:rPr lang="en-US" dirty="0" smtClean="0"/>
+              <a:t>”)</a:t>
+            </a:r>
+            <a:endParaRPr lang="en-US" dirty="0"/>
+          </a:p>
+        </p:txBody>
+      </p:sp>
+      <p:sp>
+        <p:nvSpPr>
+          <p:cNvPr id="41" name="Rectangle 40"/>
+          <p:cNvSpPr/>
+          <p:nvPr/>
+        </p:nvSpPr>
+        <p:spPr>
+          <a:xfrm>
+            <a:off x="5510211" y="1546567"/>
+            <a:ext cx="142006" cy="1036757"/>
+          </a:xfrm>
+          <a:prstGeom prst="rect">
+            <a:avLst/>
+          </a:prstGeom>
+          <a:solidFill>
+            <a:srgbClr val="0070C0"/>
+          </a:solidFill>
+          <a:ln>
+            <a:solidFill>
+              <a:schemeClr val="accent5">
+                <a:lumMod val="75000"/>
+              </a:schemeClr>
+            </a:solidFill>
+          </a:ln>
+          <a:effectLst/>
+        </p:spPr>
+        <p:style>
+          <a:lnRef idx="1">
+            <a:schemeClr val="accent3"/>
+          </a:lnRef>
+          <a:fillRef idx="2">
+            <a:schemeClr val="accent3"/>
+          </a:fillRef>
+          <a:effectRef idx="1">
+            <a:schemeClr val="accent3"/>
+          </a:effectRef>
+          <a:fontRef idx="minor">
+            <a:schemeClr val="dk1"/>
+          </a:fontRef>
+        </p:style>
+        <p:txBody>
+          <a:bodyPr rtlCol="0" anchor="ctr"/>
+          <a:lstStyle/>
+          <a:p>
+            <a:pPr algn="ctr"/>
+            <a:endParaRPr lang="en-SG" sz="1400">
+              <a:solidFill>
+                <a:schemeClr val="dk1"/>
+              </a:solidFill>
+            </a:endParaRPr>
+          </a:p>
+        </p:txBody>
+      </p:sp>
+      <p:cxnSp>
+        <p:nvCxnSpPr>
+          <p:cNvPr id="42" name="Straight Connector 41"/>
+          <p:cNvCxnSpPr/>
+          <p:nvPr/>
+        </p:nvCxnSpPr>
+        <p:spPr>
+          <a:xfrm>
+            <a:off x="5581214" y="1122308"/>
+            <a:ext cx="0" cy="1885274"/>
+          </a:xfrm>
+          <a:prstGeom prst="line">
+            <a:avLst/>
+          </a:prstGeom>
+          <a:ln w="19050">
+            <a:solidFill>
+              <a:srgbClr val="0070C0"/>
+            </a:solidFill>
+            <a:prstDash val="sysDash"/>
+          </a:ln>
+          <a:effectLst/>
+        </p:spPr>
+        <p:style>
+          <a:lnRef idx="1">
+            <a:schemeClr val="accent1"/>
+          </a:lnRef>
+          <a:fillRef idx="2">
+            <a:schemeClr val="accent1"/>
+          </a:fillRef>
+          <a:effectRef idx="1">
+            <a:schemeClr val="accent1"/>
+          </a:effectRef>
+          <a:fontRef idx="minor">
+            <a:schemeClr val="dk1"/>
+          </a:fontRef>
+        </p:style>
+      </p:cxnSp>
+      <p:cxnSp>
+        <p:nvCxnSpPr>
+          <p:cNvPr id="43" name="Straight Arrow Connector 42"/>
+          <p:cNvCxnSpPr/>
+          <p:nvPr/>
+        </p:nvCxnSpPr>
+        <p:spPr>
+          <a:xfrm>
+            <a:off x="3937568" y="1884150"/>
+            <a:ext cx="1412372" cy="0"/>
+          </a:xfrm>
+          <a:prstGeom prst="straightConnector1">
+            <a:avLst/>
+          </a:prstGeom>
+          <a:ln w="19050">
+            <a:solidFill>
+              <a:srgbClr val="0070C0"/>
+            </a:solidFill>
+            <a:tailEnd type="arrow"/>
+          </a:ln>
+        </p:spPr>
+        <p:style>
+          <a:lnRef idx="1">
+            <a:schemeClr val="accent1"/>
+          </a:lnRef>
+          <a:fillRef idx="0">
+            <a:schemeClr val="accent1"/>
+          </a:fillRef>
+          <a:effectRef idx="0">
+            <a:schemeClr val="accent1"/>
+          </a:effectRef>
+          <a:fontRef idx="minor">
+            <a:schemeClr val="tx1"/>
+          </a:fontRef>
+        </p:style>
+      </p:cxnSp>
+      <p:sp>
+        <p:nvSpPr>
+          <p:cNvPr id="45" name="Rectangle 62"/>
+          <p:cNvSpPr/>
+          <p:nvPr/>
+        </p:nvSpPr>
+        <p:spPr>
+          <a:xfrm>
+            <a:off x="6813296" y="1551657"/>
+            <a:ext cx="1817777" cy="733796"/>
+          </a:xfrm>
+          <a:prstGeom prst="rect">
+            <a:avLst/>
+          </a:prstGeom>
+          <a:solidFill>
+            <a:srgbClr val="0070C0"/>
+          </a:solidFill>
+          <a:ln w="19050">
+            <a:solidFill>
+              <a:srgbClr val="0070C0"/>
+            </a:solidFill>
+          </a:ln>
+          <a:effectLst/>
+        </p:spPr>
+        <p:style>
+          <a:lnRef idx="1">
+            <a:schemeClr val="accent2"/>
+          </a:lnRef>
+          <a:fillRef idx="2">
+            <a:schemeClr val="accent2"/>
+          </a:fillRef>
+          <a:effectRef idx="1">
+            <a:schemeClr val="accent2"/>
+          </a:effectRef>
+          <a:fontRef idx="minor">
+            <a:schemeClr val="dk1"/>
+          </a:fontRef>
+        </p:style>
+        <p:txBody>
+          <a:bodyPr rtlCol="0" anchor="ctr"/>
+          <a:lstStyle/>
+          <a:p>
+            <a:pPr algn="ctr"/>
+            <a:r>
+              <a:rPr lang="en-US" sz="1600" dirty="0" smtClean="0">
+                <a:solidFill>
+                  <a:schemeClr val="bg1"/>
+                </a:solidFill>
+              </a:rPr>
+              <a:t>m: </a:t>
+            </a:r>
+            <a:r>
+              <a:rPr lang="en-US" sz="1600" dirty="0" err="1" smtClean="0">
+                <a:solidFill>
+                  <a:schemeClr val="bg1"/>
+                </a:solidFill>
+              </a:rPr>
+              <a:t>ModifyStoragePath</a:t>
+            </a:r>
+            <a:r>
+              <a:rPr lang="en-US" sz="1600" dirty="0">
+                <a:solidFill>
+                  <a:schemeClr val="bg1"/>
+                </a:solidFill>
+              </a:rPr>
+              <a:t/>
+            </a:r>
+            <a:br>
+              <a:rPr lang="en-US" sz="1600" dirty="0">
+                <a:solidFill>
+                  <a:schemeClr val="bg1"/>
+                </a:solidFill>
+              </a:rPr>
+            </a:br>
+            <a:r>
+              <a:rPr lang="en-US" sz="1600" dirty="0">
+                <a:solidFill>
+                  <a:schemeClr val="bg1"/>
+                </a:solidFill>
+              </a:rPr>
+              <a:t>Command</a:t>
+            </a:r>
+            <a:endParaRPr lang="en-SG" sz="1600" dirty="0">
+              <a:solidFill>
+                <a:schemeClr val="bg1"/>
+              </a:solidFill>
+            </a:endParaRPr>
+          </a:p>
+        </p:txBody>
+      </p:sp>
+      <p:cxnSp>
+        <p:nvCxnSpPr>
+          <p:cNvPr id="46" name="Straight Arrow Connector 45"/>
+          <p:cNvCxnSpPr/>
+          <p:nvPr/>
+        </p:nvCxnSpPr>
+        <p:spPr>
+          <a:xfrm>
+            <a:off x="5705204" y="1884150"/>
+            <a:ext cx="944406" cy="0"/>
+          </a:xfrm>
+          <a:prstGeom prst="straightConnector1">
+            <a:avLst/>
+          </a:prstGeom>
+          <a:ln w="19050">
+            <a:solidFill>
+              <a:srgbClr val="0070C0"/>
+            </a:solidFill>
+            <a:tailEnd type="arrow"/>
+          </a:ln>
+        </p:spPr>
+        <p:style>
+          <a:lnRef idx="1">
+            <a:schemeClr val="accent1"/>
+          </a:lnRef>
+          <a:fillRef idx="0">
+            <a:schemeClr val="accent1"/>
+          </a:fillRef>
+          <a:effectRef idx="0">
+            <a:schemeClr val="accent1"/>
+          </a:effectRef>
+          <a:fontRef idx="minor">
+            <a:schemeClr val="tx1"/>
+          </a:fontRef>
+        </p:style>
+      </p:cxnSp>
+      <p:sp>
+        <p:nvSpPr>
+          <p:cNvPr id="49" name="TextBox 48"/>
+          <p:cNvSpPr txBox="1"/>
+          <p:nvPr/>
+        </p:nvSpPr>
+        <p:spPr>
+          <a:xfrm>
+            <a:off x="5849241" y="1572785"/>
+            <a:ext cx="640023" cy="215444"/>
+          </a:xfrm>
+          <a:prstGeom prst="rect">
+            <a:avLst/>
+          </a:prstGeom>
+          <a:noFill/>
+        </p:spPr>
+        <p:txBody>
+          <a:bodyPr wrap="square" lIns="0" tIns="0" rIns="0" bIns="0" rtlCol="0">
+            <a:spAutoFit/>
+          </a:bodyPr>
+          <a:lstStyle>
+            <a:defPPr>
+              <a:defRPr lang="en-US"/>
+            </a:defPPr>
+            <a:lvl1pPr algn="r">
+              <a:defRPr sz="1400">
+                <a:solidFill>
+                  <a:srgbClr val="0070C0"/>
+                </a:solidFill>
+              </a:defRPr>
+            </a:lvl1pPr>
+          </a:lstStyle>
+          <a:p>
+            <a:r>
+              <a:rPr lang="en-US" dirty="0" smtClean="0"/>
+              <a:t>create()</a:t>
+            </a:r>
+            <a:endParaRPr lang="en-US" dirty="0"/>
+          </a:p>
+        </p:txBody>
+      </p:sp>
+      <p:cxnSp>
+        <p:nvCxnSpPr>
+          <p:cNvPr id="50" name="Straight Arrow Connector 49"/>
+          <p:cNvCxnSpPr>
+            <a:endCxn id="51" idx="2"/>
+          </p:cNvCxnSpPr>
+          <p:nvPr/>
+        </p:nvCxnSpPr>
+        <p:spPr>
+          <a:xfrm flipV="1">
+            <a:off x="5751030" y="2583323"/>
+            <a:ext cx="2025938" cy="15791"/>
+          </a:xfrm>
+          <a:prstGeom prst="straightConnector1">
+            <a:avLst/>
+          </a:prstGeom>
+          <a:ln w="19050">
+            <a:solidFill>
+              <a:srgbClr val="0070C0"/>
+            </a:solidFill>
+            <a:prstDash val="sysDash"/>
+            <a:headEnd type="arrow" w="med" len="med"/>
+            <a:tailEnd type="none" w="med" len="med"/>
+          </a:ln>
+        </p:spPr>
+        <p:style>
+          <a:lnRef idx="1">
+            <a:schemeClr val="accent1"/>
+          </a:lnRef>
+          <a:fillRef idx="0">
+            <a:schemeClr val="accent1"/>
+          </a:fillRef>
+          <a:effectRef idx="0">
+            <a:schemeClr val="accent1"/>
+          </a:effectRef>
+          <a:fontRef idx="minor">
+            <a:schemeClr val="tx1"/>
+          </a:fontRef>
+        </p:style>
+      </p:cxnSp>
+      <p:sp>
+        <p:nvSpPr>
+          <p:cNvPr id="51" name="Rectangle 50"/>
+          <p:cNvSpPr/>
+          <p:nvPr/>
+        </p:nvSpPr>
+        <p:spPr>
+          <a:xfrm>
+            <a:off x="7685126" y="2267511"/>
+            <a:ext cx="183684" cy="315812"/>
+          </a:xfrm>
+          <a:prstGeom prst="rect">
+            <a:avLst/>
+          </a:prstGeom>
+          <a:solidFill>
+            <a:srgbClr val="0070C0"/>
+          </a:solidFill>
+          <a:ln>
+            <a:solidFill>
+              <a:srgbClr val="0070C0"/>
+            </a:solidFill>
+          </a:ln>
+          <a:effectLst/>
+        </p:spPr>
+        <p:style>
+          <a:lnRef idx="1">
+            <a:schemeClr val="accent3"/>
+          </a:lnRef>
+          <a:fillRef idx="2">
+            <a:schemeClr val="accent3"/>
+          </a:fillRef>
+          <a:effectRef idx="1">
+            <a:schemeClr val="accent3"/>
+          </a:effectRef>
+          <a:fontRef idx="minor">
+            <a:schemeClr val="dk1"/>
+          </a:fontRef>
+        </p:style>
+        <p:txBody>
+          <a:bodyPr rtlCol="0" anchor="ctr"/>
+          <a:lstStyle/>
+          <a:p>
+            <a:pPr algn="ctr"/>
+            <a:endParaRPr lang="en-SG" sz="1400"/>
+          </a:p>
+        </p:txBody>
+      </p:sp>
+      <p:cxnSp>
+        <p:nvCxnSpPr>
+          <p:cNvPr id="53" name="Straight Arrow Connector 52"/>
+          <p:cNvCxnSpPr/>
+          <p:nvPr/>
+        </p:nvCxnSpPr>
+        <p:spPr>
+          <a:xfrm>
+            <a:off x="3937568" y="2577648"/>
+            <a:ext cx="1452783" cy="0"/>
+          </a:xfrm>
+          <a:prstGeom prst="straightConnector1">
+            <a:avLst/>
+          </a:prstGeom>
+          <a:ln w="19050">
+            <a:solidFill>
+              <a:srgbClr val="0070C0"/>
+            </a:solidFill>
+            <a:prstDash val="sysDash"/>
+            <a:headEnd type="arrow" w="med" len="med"/>
+            <a:tailEnd type="none" w="med" len="med"/>
+          </a:ln>
+        </p:spPr>
+        <p:style>
+          <a:lnRef idx="1">
+            <a:schemeClr val="accent1"/>
+          </a:lnRef>
+          <a:fillRef idx="0">
+            <a:schemeClr val="accent1"/>
+          </a:fillRef>
+          <a:effectRef idx="0">
+            <a:schemeClr val="accent1"/>
+          </a:effectRef>
+          <a:fontRef idx="minor">
+            <a:schemeClr val="tx1"/>
+          </a:fontRef>
+        </p:style>
+      </p:cxnSp>
+      <p:sp>
+        <p:nvSpPr>
+          <p:cNvPr id="55" name="TextBox 54"/>
+          <p:cNvSpPr txBox="1"/>
+          <p:nvPr/>
+        </p:nvSpPr>
+        <p:spPr>
+          <a:xfrm>
+            <a:off x="4516010" y="2265150"/>
+            <a:ext cx="343112" cy="215444"/>
+          </a:xfrm>
+          <a:prstGeom prst="rect">
+            <a:avLst/>
+          </a:prstGeom>
+          <a:noFill/>
+        </p:spPr>
+        <p:txBody>
+          <a:bodyPr wrap="square" lIns="0" tIns="0" rIns="0" bIns="0" rtlCol="0">
+            <a:spAutoFit/>
+          </a:bodyPr>
+          <a:lstStyle>
+            <a:defPPr>
+              <a:defRPr lang="en-US"/>
+            </a:defPPr>
+            <a:lvl1pPr algn="r">
+              <a:defRPr sz="1400">
+                <a:solidFill>
+                  <a:srgbClr val="0070C0"/>
+                </a:solidFill>
+              </a:defRPr>
+            </a:lvl1pPr>
+          </a:lstStyle>
+          <a:p>
+            <a:r>
+              <a:rPr lang="en-US" dirty="0"/>
+              <a:t>m</a:t>
+            </a:r>
+            <a:endParaRPr lang="en-US" dirty="0"/>
+          </a:p>
+        </p:txBody>
+      </p:sp>
+      <p:sp>
+        <p:nvSpPr>
+          <p:cNvPr id="60" name="Rectangle 59"/>
+          <p:cNvSpPr/>
+          <p:nvPr/>
+        </p:nvSpPr>
+        <p:spPr>
+          <a:xfrm>
+            <a:off x="7703236" y="3011191"/>
+            <a:ext cx="178182" cy="2990743"/>
+          </a:xfrm>
+          <a:prstGeom prst="rect">
+            <a:avLst/>
+          </a:prstGeom>
+          <a:solidFill>
+            <a:srgbClr val="0070C0"/>
+          </a:solidFill>
+          <a:ln>
+            <a:solidFill>
+              <a:srgbClr val="0070C0"/>
+            </a:solidFill>
+          </a:ln>
+          <a:effectLst/>
+        </p:spPr>
+        <p:style>
+          <a:lnRef idx="1">
+            <a:schemeClr val="accent3"/>
+          </a:lnRef>
+          <a:fillRef idx="2">
+            <a:schemeClr val="accent3"/>
+          </a:fillRef>
+          <a:effectRef idx="1">
+            <a:schemeClr val="accent3"/>
+          </a:effectRef>
+          <a:fontRef idx="minor">
+            <a:schemeClr val="dk1"/>
+          </a:fontRef>
+        </p:style>
+        <p:txBody>
+          <a:bodyPr rtlCol="0" anchor="ctr"/>
+          <a:lstStyle/>
+          <a:p>
+            <a:pPr algn="ctr"/>
+            <a:endParaRPr lang="en-SG" sz="1400"/>
+          </a:p>
+        </p:txBody>
+      </p:sp>
+      <p:cxnSp>
+        <p:nvCxnSpPr>
+          <p:cNvPr id="61" name="Straight Connector 60"/>
+          <p:cNvCxnSpPr/>
+          <p:nvPr/>
+        </p:nvCxnSpPr>
+        <p:spPr>
+          <a:xfrm flipH="1">
+            <a:off x="7796161" y="2577648"/>
+            <a:ext cx="9153" cy="3664480"/>
+          </a:xfrm>
+          <a:prstGeom prst="line">
+            <a:avLst/>
+          </a:prstGeom>
+          <a:ln w="19050">
+            <a:solidFill>
+              <a:srgbClr val="0070C0"/>
+            </a:solidFill>
+            <a:prstDash val="sysDash"/>
+          </a:ln>
+          <a:effectLst/>
+        </p:spPr>
+        <p:style>
+          <a:lnRef idx="1">
+            <a:schemeClr val="accent1"/>
+          </a:lnRef>
+          <a:fillRef idx="2">
+            <a:schemeClr val="accent1"/>
+          </a:fillRef>
+          <a:effectRef idx="1">
+            <a:schemeClr val="accent1"/>
+          </a:effectRef>
+          <a:fontRef idx="minor">
+            <a:schemeClr val="dk1"/>
+          </a:fontRef>
+        </p:style>
+      </p:cxnSp>
+      <p:cxnSp>
+        <p:nvCxnSpPr>
+          <p:cNvPr id="62" name="Straight Arrow Connector 61"/>
+          <p:cNvCxnSpPr/>
+          <p:nvPr/>
+        </p:nvCxnSpPr>
+        <p:spPr>
+          <a:xfrm>
+            <a:off x="3944760" y="3255750"/>
+            <a:ext cx="3612540" cy="0"/>
+          </a:xfrm>
+          <a:prstGeom prst="straightConnector1">
+            <a:avLst/>
+          </a:prstGeom>
+          <a:ln w="19050">
+            <a:solidFill>
+              <a:srgbClr val="0070C0"/>
+            </a:solidFill>
+            <a:tailEnd type="arrow"/>
+          </a:ln>
+        </p:spPr>
+        <p:style>
+          <a:lnRef idx="1">
+            <a:schemeClr val="accent1"/>
+          </a:lnRef>
+          <a:fillRef idx="0">
+            <a:schemeClr val="accent1"/>
+          </a:fillRef>
+          <a:effectRef idx="0">
+            <a:schemeClr val="accent1"/>
+          </a:effectRef>
+          <a:fontRef idx="minor">
+            <a:schemeClr val="tx1"/>
+          </a:fontRef>
+        </p:style>
+      </p:cxnSp>
+      <p:sp>
+        <p:nvSpPr>
+          <p:cNvPr id="63" name="TextBox 62"/>
+          <p:cNvSpPr txBox="1"/>
+          <p:nvPr/>
+        </p:nvSpPr>
+        <p:spPr>
+          <a:xfrm>
+            <a:off x="5421336" y="3024001"/>
+            <a:ext cx="855809" cy="215444"/>
+          </a:xfrm>
+          <a:prstGeom prst="rect">
+            <a:avLst/>
+          </a:prstGeom>
+          <a:noFill/>
+        </p:spPr>
+        <p:txBody>
+          <a:bodyPr wrap="square" lIns="0" tIns="0" rIns="0" bIns="0" rtlCol="0">
+            <a:spAutoFit/>
+          </a:bodyPr>
+          <a:lstStyle>
+            <a:defPPr>
+              <a:defRPr lang="en-US"/>
+            </a:defPPr>
+            <a:lvl1pPr algn="r">
+              <a:defRPr sz="1400">
+                <a:solidFill>
+                  <a:srgbClr val="0070C0"/>
+                </a:solidFill>
+              </a:defRPr>
+            </a:lvl1pPr>
+          </a:lstStyle>
+          <a:p>
+            <a:r>
+              <a:rPr lang="en-US" dirty="0"/>
+              <a:t>execute()</a:t>
+            </a:r>
+          </a:p>
+        </p:txBody>
+      </p:sp>
+      <p:cxnSp>
+        <p:nvCxnSpPr>
+          <p:cNvPr id="64" name="Straight Arrow Connector 63"/>
+          <p:cNvCxnSpPr/>
+          <p:nvPr/>
+        </p:nvCxnSpPr>
+        <p:spPr>
+          <a:xfrm>
+            <a:off x="3937568" y="3657600"/>
+            <a:ext cx="3651369" cy="0"/>
+          </a:xfrm>
+          <a:prstGeom prst="straightConnector1">
+            <a:avLst/>
+          </a:prstGeom>
+          <a:ln w="19050">
+            <a:solidFill>
+              <a:srgbClr val="0070C0"/>
+            </a:solidFill>
+            <a:prstDash val="sysDash"/>
+            <a:headEnd type="arrow" w="med" len="med"/>
+            <a:tailEnd type="none" w="med" len="med"/>
+          </a:ln>
+        </p:spPr>
+        <p:style>
+          <a:lnRef idx="1">
+            <a:schemeClr val="accent1"/>
+          </a:lnRef>
+          <a:fillRef idx="0">
+            <a:schemeClr val="accent1"/>
+          </a:fillRef>
+          <a:effectRef idx="0">
+            <a:schemeClr val="accent1"/>
+          </a:effectRef>
+          <a:fontRef idx="minor">
+            <a:schemeClr val="tx1"/>
+          </a:fontRef>
+        </p:style>
+      </p:cxnSp>
+      <p:sp>
+        <p:nvSpPr>
+          <p:cNvPr id="65" name="TextBox 64"/>
+          <p:cNvSpPr txBox="1"/>
+          <p:nvPr/>
+        </p:nvSpPr>
+        <p:spPr>
+          <a:xfrm>
+            <a:off x="5467044" y="3433648"/>
+            <a:ext cx="621216" cy="215444"/>
+          </a:xfrm>
+          <a:prstGeom prst="rect">
+            <a:avLst/>
+          </a:prstGeom>
+          <a:noFill/>
+        </p:spPr>
+        <p:txBody>
+          <a:bodyPr wrap="square" lIns="0" tIns="0" rIns="0" bIns="0" rtlCol="0">
+            <a:spAutoFit/>
+          </a:bodyPr>
+          <a:lstStyle>
+            <a:defPPr>
+              <a:defRPr lang="en-US"/>
+            </a:defPPr>
+            <a:lvl1pPr algn="r">
+              <a:defRPr sz="1400">
+                <a:solidFill>
+                  <a:srgbClr val="0070C0"/>
+                </a:solidFill>
+              </a:defRPr>
+            </a:lvl1pPr>
+          </a:lstStyle>
+          <a:p>
+            <a:r>
+              <a:rPr lang="en-US" dirty="0" smtClean="0"/>
+              <a:t>result</a:t>
+            </a:r>
+            <a:endParaRPr lang="en-US" dirty="0"/>
+          </a:p>
+        </p:txBody>
+      </p:sp>
+      <p:cxnSp>
+        <p:nvCxnSpPr>
+          <p:cNvPr id="68" name="Straight Arrow Connector 67"/>
+          <p:cNvCxnSpPr/>
+          <p:nvPr/>
+        </p:nvCxnSpPr>
+        <p:spPr>
+          <a:xfrm>
+            <a:off x="7950425" y="4289371"/>
+            <a:ext cx="944406" cy="0"/>
+          </a:xfrm>
+          <a:prstGeom prst="straightConnector1">
+            <a:avLst/>
+          </a:prstGeom>
+          <a:ln w="19050">
+            <a:solidFill>
+              <a:srgbClr val="0070C0"/>
+            </a:solidFill>
+            <a:tailEnd type="arrow"/>
+          </a:ln>
+        </p:spPr>
+        <p:style>
+          <a:lnRef idx="1">
+            <a:schemeClr val="accent1"/>
+          </a:lnRef>
+          <a:fillRef idx="0">
+            <a:schemeClr val="accent1"/>
+          </a:fillRef>
+          <a:effectRef idx="0">
+            <a:schemeClr val="accent1"/>
+          </a:effectRef>
+          <a:fontRef idx="minor">
+            <a:schemeClr val="tx1"/>
+          </a:fontRef>
+        </p:style>
+      </p:cxnSp>
+      <p:sp>
+        <p:nvSpPr>
+          <p:cNvPr id="70" name="TextBox 69"/>
+          <p:cNvSpPr txBox="1"/>
+          <p:nvPr/>
+        </p:nvSpPr>
+        <p:spPr>
+          <a:xfrm>
+            <a:off x="4627625" y="5029735"/>
+            <a:ext cx="3794288" cy="215444"/>
+          </a:xfrm>
+          <a:prstGeom prst="rect">
+            <a:avLst/>
+          </a:prstGeom>
+          <a:noFill/>
+        </p:spPr>
+        <p:txBody>
+          <a:bodyPr wrap="square" lIns="0" tIns="0" rIns="0" bIns="0" rtlCol="0">
+            <a:spAutoFit/>
+          </a:bodyPr>
+          <a:lstStyle/>
+          <a:p>
+            <a:r>
+              <a:rPr lang="en-US" sz="1400" dirty="0" smtClean="0">
+                <a:solidFill>
+                  <a:schemeClr val="accent5">
+                    <a:lumMod val="75000"/>
+                  </a:schemeClr>
+                </a:solidFill>
+              </a:rPr>
+              <a:t>post(</a:t>
+            </a:r>
+            <a:r>
+              <a:rPr lang="en-US" sz="1400" dirty="0" err="1" smtClean="0">
+                <a:solidFill>
+                  <a:schemeClr val="accent5">
+                    <a:lumMod val="75000"/>
+                  </a:schemeClr>
+                </a:solidFill>
+              </a:rPr>
+              <a:t>ActivityManagerChangedEvent</a:t>
+            </a:r>
+            <a:r>
+              <a:rPr lang="en-US" sz="1400" dirty="0" smtClean="0">
+                <a:solidFill>
+                  <a:schemeClr val="accent5">
+                    <a:lumMod val="75000"/>
+                  </a:schemeClr>
+                </a:solidFill>
+              </a:rPr>
+              <a:t>()</a:t>
+            </a:r>
+            <a:endParaRPr lang="en-US" sz="1400" dirty="0">
+              <a:solidFill>
+                <a:schemeClr val="accent5">
+                  <a:lumMod val="75000"/>
+                </a:schemeClr>
+              </a:solidFill>
+            </a:endParaRPr>
+          </a:p>
+        </p:txBody>
+      </p:sp>
+      <p:cxnSp>
+        <p:nvCxnSpPr>
+          <p:cNvPr id="71" name="Straight Arrow Connector 70"/>
+          <p:cNvCxnSpPr/>
+          <p:nvPr/>
+        </p:nvCxnSpPr>
+        <p:spPr>
+          <a:xfrm flipH="1">
+            <a:off x="4660529" y="5518862"/>
+            <a:ext cx="2887208" cy="0"/>
+          </a:xfrm>
+          <a:prstGeom prst="straightConnector1">
+            <a:avLst/>
+          </a:prstGeom>
+          <a:ln w="19050">
+            <a:solidFill>
+              <a:srgbClr val="0070C0"/>
+            </a:solidFill>
+            <a:tailEnd type="arrow"/>
+          </a:ln>
+        </p:spPr>
+        <p:style>
+          <a:lnRef idx="1">
+            <a:schemeClr val="accent1"/>
+          </a:lnRef>
+          <a:fillRef idx="0">
+            <a:schemeClr val="accent1"/>
+          </a:fillRef>
+          <a:effectRef idx="0">
+            <a:schemeClr val="accent1"/>
+          </a:effectRef>
+          <a:fontRef idx="minor">
+            <a:schemeClr val="tx1"/>
+          </a:fontRef>
+        </p:style>
+      </p:cxnSp>
+      <p:sp>
+        <p:nvSpPr>
+          <p:cNvPr id="76" name="TextBox 75"/>
+          <p:cNvSpPr txBox="1"/>
+          <p:nvPr/>
+        </p:nvSpPr>
+        <p:spPr>
+          <a:xfrm>
+            <a:off x="66246" y="4814292"/>
+            <a:ext cx="929422" cy="430887"/>
+          </a:xfrm>
+          <a:prstGeom prst="rect">
+            <a:avLst/>
+          </a:prstGeom>
+          <a:noFill/>
+        </p:spPr>
+        <p:txBody>
+          <a:bodyPr wrap="square" lIns="0" tIns="0" rIns="0" bIns="0" rtlCol="0">
+            <a:spAutoFit/>
+          </a:bodyPr>
+          <a:lstStyle/>
+          <a:p>
+            <a:pPr algn="r"/>
+            <a:r>
+              <a:rPr lang="en-US" sz="1400" dirty="0" smtClean="0">
+                <a:solidFill>
+                  <a:srgbClr val="00B050"/>
+                </a:solidFill>
+              </a:rPr>
+              <a:t>Show pop up message</a:t>
+            </a:r>
+            <a:endParaRPr lang="en-US" sz="1400" dirty="0">
+              <a:solidFill>
+                <a:srgbClr val="00B050"/>
+              </a:solidFill>
+            </a:endParaRPr>
+          </a:p>
+        </p:txBody>
+      </p:sp>
     </p:spTree>
     <p:extLst>
       <p:ext uri="{BB962C8B-B14F-4D97-AF65-F5344CB8AC3E}">

</xml_diff>